<commit_message>
Added Section 1.2 and 1.4
Added pages on section 1.2 and 1.4 and fixed index page to include these
</commit_message>
<xml_diff>
--- a/Lecture Slides/VideoLectureSlides/1.5.pptx
+++ b/Lecture Slides/VideoLectureSlides/1.5.pptx
@@ -9,11 +9,11 @@
   </p:notesMasterIdLst>
   <p:sldIdLst>
     <p:sldId id="256" r:id="rId5"/>
-    <p:sldId id="288" r:id="rId6"/>
-    <p:sldId id="289" r:id="rId7"/>
-    <p:sldId id="290" r:id="rId8"/>
-    <p:sldId id="292" r:id="rId9"/>
-    <p:sldId id="293" r:id="rId10"/>
+    <p:sldId id="314" r:id="rId6"/>
+    <p:sldId id="321" r:id="rId7"/>
+    <p:sldId id="318" r:id="rId8"/>
+    <p:sldId id="319" r:id="rId9"/>
+    <p:sldId id="320" r:id="rId10"/>
     <p:sldId id="287" r:id="rId11"/>
   </p:sldIdLst>
   <p:sldSz cx="9144000" cy="6858000" type="screen4x3"/>
@@ -149,7 +149,7 @@
 <file path=ppt/revisionInfo.xml><?xml version="1.0" encoding="utf-8"?>
 <p1510:revInfo xmlns:a="http://schemas.openxmlformats.org/drawingml/2006/main" xmlns:r="http://schemas.openxmlformats.org/officeDocument/2006/relationships" xmlns:p1510="http://schemas.microsoft.com/office/powerpoint/2015/10/main">
   <p1510:revLst>
-    <p1510:client id="{B19E1BD0-F712-4867-B478-84220143970B}" v="99" dt="2020-08-23T18:33:19.737"/>
+    <p1510:client id="{1C3D8284-AEA8-4EED-95A7-E4830532795F}" v="936" dt="2020-09-01T20:22:20.253"/>
   </p1510:revLst>
 </p1510:revInfo>
 </file>
@@ -157,20 +157,20 @@
 <file path=ppt/changesInfos/changesInfo1.xml><?xml version="1.0" encoding="utf-8"?>
 <pc:chgInfo xmlns:a="http://schemas.openxmlformats.org/drawingml/2006/main" xmlns:r="http://schemas.openxmlformats.org/officeDocument/2006/relationships" xmlns:ac="http://schemas.microsoft.com/office/drawing/2013/main/command" xmlns:pc="http://schemas.microsoft.com/office/powerpoint/2013/main/command">
   <pc:docChgLst>
-    <pc:chgData name="Moore, Jacob Preston" userId="fdd3fd0f-c483-48c9-988d-7deb216763fd" providerId="ADAL" clId="{1DEC9EA4-08C1-4B16-BA96-BA475B1550BC}"/>
-    <pc:docChg chg="custSel addSld delSld modSld">
-      <pc:chgData name="Moore, Jacob Preston" userId="fdd3fd0f-c483-48c9-988d-7deb216763fd" providerId="ADAL" clId="{1DEC9EA4-08C1-4B16-BA96-BA475B1550BC}" dt="2020-08-23T18:23:16.909" v="52" actId="2696"/>
+    <pc:chgData name="Moore, Jacob Preston" userId="fdd3fd0f-c483-48c9-988d-7deb216763fd" providerId="ADAL" clId="{A3E22C7C-4C51-4CF8-80D5-877CD6E8A6D1}"/>
+    <pc:docChg chg="custSel mod addSld delSld modSld">
+      <pc:chgData name="Moore, Jacob Preston" userId="fdd3fd0f-c483-48c9-988d-7deb216763fd" providerId="ADAL" clId="{A3E22C7C-4C51-4CF8-80D5-877CD6E8A6D1}" dt="2020-08-21T15:29:23.267" v="589" actId="20577"/>
       <pc:docMkLst>
         <pc:docMk/>
       </pc:docMkLst>
       <pc:sldChg chg="modSp">
-        <pc:chgData name="Moore, Jacob Preston" userId="fdd3fd0f-c483-48c9-988d-7deb216763fd" providerId="ADAL" clId="{1DEC9EA4-08C1-4B16-BA96-BA475B1550BC}" dt="2020-08-23T18:22:09.171" v="36" actId="20577"/>
+        <pc:chgData name="Moore, Jacob Preston" userId="fdd3fd0f-c483-48c9-988d-7deb216763fd" providerId="ADAL" clId="{A3E22C7C-4C51-4CF8-80D5-877CD6E8A6D1}" dt="2020-08-21T14:39:36.368" v="12" actId="20577"/>
         <pc:sldMkLst>
           <pc:docMk/>
           <pc:sldMk cId="3080430471" sldId="256"/>
         </pc:sldMkLst>
         <pc:spChg chg="mod">
-          <ac:chgData name="Moore, Jacob Preston" userId="fdd3fd0f-c483-48c9-988d-7deb216763fd" providerId="ADAL" clId="{1DEC9EA4-08C1-4B16-BA96-BA475B1550BC}" dt="2020-08-23T18:22:09.171" v="36" actId="20577"/>
+          <ac:chgData name="Moore, Jacob Preston" userId="fdd3fd0f-c483-48c9-988d-7deb216763fd" providerId="ADAL" clId="{A3E22C7C-4C51-4CF8-80D5-877CD6E8A6D1}" dt="2020-08-21T14:39:36.368" v="12" actId="20577"/>
           <ac:spMkLst>
             <pc:docMk/>
             <pc:sldMk cId="3080430471" sldId="256"/>
@@ -179,200 +179,263 @@
         </pc:spChg>
       </pc:sldChg>
       <pc:sldChg chg="del">
-        <pc:chgData name="Moore, Jacob Preston" userId="fdd3fd0f-c483-48c9-988d-7deb216763fd" providerId="ADAL" clId="{1DEC9EA4-08C1-4B16-BA96-BA475B1550BC}" dt="2020-08-23T18:23:10.125" v="37" actId="2696"/>
+        <pc:chgData name="Moore, Jacob Preston" userId="fdd3fd0f-c483-48c9-988d-7deb216763fd" providerId="ADAL" clId="{A3E22C7C-4C51-4CF8-80D5-877CD6E8A6D1}" dt="2020-08-21T15:16:17.107" v="13" actId="2696"/>
         <pc:sldMkLst>
           <pc:docMk/>
-          <pc:sldMk cId="3309860852" sldId="288"/>
-        </pc:sldMkLst>
-      </pc:sldChg>
-      <pc:sldChg chg="add">
-        <pc:chgData name="Moore, Jacob Preston" userId="fdd3fd0f-c483-48c9-988d-7deb216763fd" providerId="ADAL" clId="{1DEC9EA4-08C1-4B16-BA96-BA475B1550BC}" dt="2020-08-23T18:23:12.302" v="47"/>
-        <pc:sldMkLst>
-          <pc:docMk/>
-          <pc:sldMk cId="3642683568" sldId="288"/>
+          <pc:sldMk cId="873321717" sldId="304"/>
         </pc:sldMkLst>
       </pc:sldChg>
       <pc:sldChg chg="del">
-        <pc:chgData name="Moore, Jacob Preston" userId="fdd3fd0f-c483-48c9-988d-7deb216763fd" providerId="ADAL" clId="{1DEC9EA4-08C1-4B16-BA96-BA475B1550BC}" dt="2020-08-23T18:23:10.273" v="39" actId="2696"/>
+        <pc:chgData name="Moore, Jacob Preston" userId="fdd3fd0f-c483-48c9-988d-7deb216763fd" providerId="ADAL" clId="{A3E22C7C-4C51-4CF8-80D5-877CD6E8A6D1}" dt="2020-08-21T15:16:17.292" v="14" actId="2696"/>
         <pc:sldMkLst>
           <pc:docMk/>
-          <pc:sldMk cId="1182082120" sldId="289"/>
-        </pc:sldMkLst>
-      </pc:sldChg>
-      <pc:sldChg chg="add">
-        <pc:chgData name="Moore, Jacob Preston" userId="fdd3fd0f-c483-48c9-988d-7deb216763fd" providerId="ADAL" clId="{1DEC9EA4-08C1-4B16-BA96-BA475B1550BC}" dt="2020-08-23T18:23:12.302" v="47"/>
-        <pc:sldMkLst>
-          <pc:docMk/>
-          <pc:sldMk cId="2525870602" sldId="289"/>
-        </pc:sldMkLst>
-      </pc:sldChg>
-      <pc:sldChg chg="add">
-        <pc:chgData name="Moore, Jacob Preston" userId="fdd3fd0f-c483-48c9-988d-7deb216763fd" providerId="ADAL" clId="{1DEC9EA4-08C1-4B16-BA96-BA475B1550BC}" dt="2020-08-23T18:23:12.302" v="47"/>
-        <pc:sldMkLst>
-          <pc:docMk/>
-          <pc:sldMk cId="444073582" sldId="290"/>
+          <pc:sldMk cId="3757804491" sldId="305"/>
         </pc:sldMkLst>
       </pc:sldChg>
       <pc:sldChg chg="del">
-        <pc:chgData name="Moore, Jacob Preston" userId="fdd3fd0f-c483-48c9-988d-7deb216763fd" providerId="ADAL" clId="{1DEC9EA4-08C1-4B16-BA96-BA475B1550BC}" dt="2020-08-23T18:23:10.341" v="40" actId="2696"/>
+        <pc:chgData name="Moore, Jacob Preston" userId="fdd3fd0f-c483-48c9-988d-7deb216763fd" providerId="ADAL" clId="{A3E22C7C-4C51-4CF8-80D5-877CD6E8A6D1}" dt="2020-08-21T15:16:17.335" v="15" actId="2696"/>
         <pc:sldMkLst>
           <pc:docMk/>
-          <pc:sldMk cId="1878726931" sldId="290"/>
+          <pc:sldMk cId="929007296" sldId="306"/>
         </pc:sldMkLst>
       </pc:sldChg>
       <pc:sldChg chg="del">
-        <pc:chgData name="Moore, Jacob Preston" userId="fdd3fd0f-c483-48c9-988d-7deb216763fd" providerId="ADAL" clId="{1DEC9EA4-08C1-4B16-BA96-BA475B1550BC}" dt="2020-08-23T18:23:10.364" v="41" actId="2696"/>
+        <pc:chgData name="Moore, Jacob Preston" userId="fdd3fd0f-c483-48c9-988d-7deb216763fd" providerId="ADAL" clId="{A3E22C7C-4C51-4CF8-80D5-877CD6E8A6D1}" dt="2020-08-21T15:16:17.349" v="16" actId="2696"/>
         <pc:sldMkLst>
           <pc:docMk/>
-          <pc:sldMk cId="85784440" sldId="291"/>
+          <pc:sldMk cId="67018790" sldId="308"/>
         </pc:sldMkLst>
       </pc:sldChg>
       <pc:sldChg chg="del">
-        <pc:chgData name="Moore, Jacob Preston" userId="fdd3fd0f-c483-48c9-988d-7deb216763fd" providerId="ADAL" clId="{1DEC9EA4-08C1-4B16-BA96-BA475B1550BC}" dt="2020-08-23T18:23:10.387" v="42" actId="2696"/>
+        <pc:chgData name="Moore, Jacob Preston" userId="fdd3fd0f-c483-48c9-988d-7deb216763fd" providerId="ADAL" clId="{A3E22C7C-4C51-4CF8-80D5-877CD6E8A6D1}" dt="2020-08-21T15:16:17.357" v="17" actId="2696"/>
         <pc:sldMkLst>
           <pc:docMk/>
-          <pc:sldMk cId="1065110183" sldId="292"/>
+          <pc:sldMk cId="4249289280" sldId="309"/>
         </pc:sldMkLst>
       </pc:sldChg>
-      <pc:sldChg chg="add">
-        <pc:chgData name="Moore, Jacob Preston" userId="fdd3fd0f-c483-48c9-988d-7deb216763fd" providerId="ADAL" clId="{1DEC9EA4-08C1-4B16-BA96-BA475B1550BC}" dt="2020-08-23T18:23:12.302" v="47"/>
+      <pc:sldChg chg="modSp add">
+        <pc:chgData name="Moore, Jacob Preston" userId="fdd3fd0f-c483-48c9-988d-7deb216763fd" providerId="ADAL" clId="{A3E22C7C-4C51-4CF8-80D5-877CD6E8A6D1}" dt="2020-08-21T15:20:48.792" v="91" actId="115"/>
         <pc:sldMkLst>
           <pc:docMk/>
-          <pc:sldMk cId="1790905930" sldId="292"/>
+          <pc:sldMk cId="3576391048" sldId="314"/>
+        </pc:sldMkLst>
+        <pc:spChg chg="mod">
+          <ac:chgData name="Moore, Jacob Preston" userId="fdd3fd0f-c483-48c9-988d-7deb216763fd" providerId="ADAL" clId="{A3E22C7C-4C51-4CF8-80D5-877CD6E8A6D1}" dt="2020-08-21T15:20:48.792" v="91" actId="115"/>
+          <ac:spMkLst>
+            <pc:docMk/>
+            <pc:sldMk cId="3576391048" sldId="314"/>
+            <ac:spMk id="3" creationId="{00000000-0000-0000-0000-000000000000}"/>
+          </ac:spMkLst>
+        </pc:spChg>
+      </pc:sldChg>
+      <pc:sldChg chg="addSp modSp add">
+        <pc:chgData name="Moore, Jacob Preston" userId="fdd3fd0f-c483-48c9-988d-7deb216763fd" providerId="ADAL" clId="{A3E22C7C-4C51-4CF8-80D5-877CD6E8A6D1}" dt="2020-08-21T15:24:46.969" v="364" actId="27636"/>
+        <pc:sldMkLst>
+          <pc:docMk/>
+          <pc:sldMk cId="1496043169" sldId="318"/>
+        </pc:sldMkLst>
+        <pc:spChg chg="mod">
+          <ac:chgData name="Moore, Jacob Preston" userId="fdd3fd0f-c483-48c9-988d-7deb216763fd" providerId="ADAL" clId="{A3E22C7C-4C51-4CF8-80D5-877CD6E8A6D1}" dt="2020-08-21T15:24:46.969" v="364" actId="27636"/>
+          <ac:spMkLst>
+            <pc:docMk/>
+            <pc:sldMk cId="1496043169" sldId="318"/>
+            <ac:spMk id="3" creationId="{00000000-0000-0000-0000-000000000000}"/>
+          </ac:spMkLst>
+        </pc:spChg>
+        <pc:picChg chg="add mod">
+          <ac:chgData name="Moore, Jacob Preston" userId="fdd3fd0f-c483-48c9-988d-7deb216763fd" providerId="ADAL" clId="{A3E22C7C-4C51-4CF8-80D5-877CD6E8A6D1}" dt="2020-08-21T15:24:43.941" v="362" actId="1076"/>
+          <ac:picMkLst>
+            <pc:docMk/>
+            <pc:sldMk cId="1496043169" sldId="318"/>
+            <ac:picMk id="2050" creationId="{2B4F3925-8942-46AC-853C-A4FB8EE3A98C}"/>
+          </ac:picMkLst>
+        </pc:picChg>
+      </pc:sldChg>
+      <pc:sldChg chg="modSp add modAnim">
+        <pc:chgData name="Moore, Jacob Preston" userId="fdd3fd0f-c483-48c9-988d-7deb216763fd" providerId="ADAL" clId="{A3E22C7C-4C51-4CF8-80D5-877CD6E8A6D1}" dt="2020-08-21T15:29:23.267" v="589" actId="20577"/>
+        <pc:sldMkLst>
+          <pc:docMk/>
+          <pc:sldMk cId="3724594762" sldId="319"/>
+        </pc:sldMkLst>
+        <pc:spChg chg="mod">
+          <ac:chgData name="Moore, Jacob Preston" userId="fdd3fd0f-c483-48c9-988d-7deb216763fd" providerId="ADAL" clId="{A3E22C7C-4C51-4CF8-80D5-877CD6E8A6D1}" dt="2020-08-21T15:28:59.830" v="585" actId="20577"/>
+          <ac:spMkLst>
+            <pc:docMk/>
+            <pc:sldMk cId="3724594762" sldId="319"/>
+            <ac:spMk id="3" creationId="{00000000-0000-0000-0000-000000000000}"/>
+          </ac:spMkLst>
+        </pc:spChg>
+        <pc:spChg chg="mod">
+          <ac:chgData name="Moore, Jacob Preston" userId="fdd3fd0f-c483-48c9-988d-7deb216763fd" providerId="ADAL" clId="{A3E22C7C-4C51-4CF8-80D5-877CD6E8A6D1}" dt="2020-08-21T15:29:23.267" v="589" actId="20577"/>
+          <ac:spMkLst>
+            <pc:docMk/>
+            <pc:sldMk cId="3724594762" sldId="319"/>
+            <ac:spMk id="10" creationId="{00000000-0000-0000-0000-000000000000}"/>
+          </ac:spMkLst>
+        </pc:spChg>
+        <pc:spChg chg="mod">
+          <ac:chgData name="Moore, Jacob Preston" userId="fdd3fd0f-c483-48c9-988d-7deb216763fd" providerId="ADAL" clId="{A3E22C7C-4C51-4CF8-80D5-877CD6E8A6D1}" dt="2020-08-21T15:29:20.292" v="587" actId="20577"/>
+          <ac:spMkLst>
+            <pc:docMk/>
+            <pc:sldMk cId="3724594762" sldId="319"/>
+            <ac:spMk id="12" creationId="{00000000-0000-0000-0000-000000000000}"/>
+          </ac:spMkLst>
+        </pc:spChg>
+      </pc:sldChg>
+      <pc:sldChg chg="add">
+        <pc:chgData name="Moore, Jacob Preston" userId="fdd3fd0f-c483-48c9-988d-7deb216763fd" providerId="ADAL" clId="{A3E22C7C-4C51-4CF8-80D5-877CD6E8A6D1}" dt="2020-08-21T15:16:22.032" v="18"/>
+        <pc:sldMkLst>
+          <pc:docMk/>
+          <pc:sldMk cId="3535607454" sldId="320"/>
         </pc:sldMkLst>
       </pc:sldChg>
-      <pc:sldChg chg="del">
-        <pc:chgData name="Moore, Jacob Preston" userId="fdd3fd0f-c483-48c9-988d-7deb216763fd" providerId="ADAL" clId="{1DEC9EA4-08C1-4B16-BA96-BA475B1550BC}" dt="2020-08-23T18:23:10.403" v="43" actId="2696"/>
+      <pc:sldChg chg="addSp modSp add mod modClrScheme chgLayout">
+        <pc:chgData name="Moore, Jacob Preston" userId="fdd3fd0f-c483-48c9-988d-7deb216763fd" providerId="ADAL" clId="{A3E22C7C-4C51-4CF8-80D5-877CD6E8A6D1}" dt="2020-08-21T15:23:22.775" v="354" actId="26606"/>
         <pc:sldMkLst>
           <pc:docMk/>
-          <pc:sldMk cId="4127202656" sldId="293"/>
+          <pc:sldMk cId="80664795" sldId="321"/>
         </pc:sldMkLst>
-      </pc:sldChg>
-      <pc:sldChg chg="del">
-        <pc:chgData name="Moore, Jacob Preston" userId="fdd3fd0f-c483-48c9-988d-7deb216763fd" providerId="ADAL" clId="{1DEC9EA4-08C1-4B16-BA96-BA475B1550BC}" dt="2020-08-23T18:23:10.430" v="44" actId="2696"/>
-        <pc:sldMkLst>
-          <pc:docMk/>
-          <pc:sldMk cId="3956896579" sldId="294"/>
-        </pc:sldMkLst>
-      </pc:sldChg>
-      <pc:sldChg chg="del">
-        <pc:chgData name="Moore, Jacob Preston" userId="fdd3fd0f-c483-48c9-988d-7deb216763fd" providerId="ADAL" clId="{1DEC9EA4-08C1-4B16-BA96-BA475B1550BC}" dt="2020-08-23T18:23:10.480" v="45" actId="2696"/>
-        <pc:sldMkLst>
-          <pc:docMk/>
-          <pc:sldMk cId="3462403737" sldId="295"/>
-        </pc:sldMkLst>
-      </pc:sldChg>
-      <pc:sldChg chg="del">
-        <pc:chgData name="Moore, Jacob Preston" userId="fdd3fd0f-c483-48c9-988d-7deb216763fd" providerId="ADAL" clId="{1DEC9EA4-08C1-4B16-BA96-BA475B1550BC}" dt="2020-08-23T18:23:10.585" v="46" actId="2696"/>
-        <pc:sldMkLst>
-          <pc:docMk/>
-          <pc:sldMk cId="3545132802" sldId="296"/>
-        </pc:sldMkLst>
-      </pc:sldChg>
-      <pc:sldChg chg="del">
-        <pc:chgData name="Moore, Jacob Preston" userId="fdd3fd0f-c483-48c9-988d-7deb216763fd" providerId="ADAL" clId="{1DEC9EA4-08C1-4B16-BA96-BA475B1550BC}" dt="2020-08-23T18:23:16.880" v="48" actId="2696"/>
-        <pc:sldMkLst>
-          <pc:docMk/>
-          <pc:sldMk cId="948972480" sldId="297"/>
-        </pc:sldMkLst>
-      </pc:sldChg>
-      <pc:sldChg chg="del">
-        <pc:chgData name="Moore, Jacob Preston" userId="fdd3fd0f-c483-48c9-988d-7deb216763fd" providerId="ADAL" clId="{1DEC9EA4-08C1-4B16-BA96-BA475B1550BC}" dt="2020-08-23T18:23:16.887" v="49" actId="2696"/>
-        <pc:sldMkLst>
-          <pc:docMk/>
-          <pc:sldMk cId="307900893" sldId="298"/>
-        </pc:sldMkLst>
-      </pc:sldChg>
-      <pc:sldChg chg="del">
-        <pc:chgData name="Moore, Jacob Preston" userId="fdd3fd0f-c483-48c9-988d-7deb216763fd" providerId="ADAL" clId="{1DEC9EA4-08C1-4B16-BA96-BA475B1550BC}" dt="2020-08-23T18:23:16.901" v="51" actId="2696"/>
-        <pc:sldMkLst>
-          <pc:docMk/>
-          <pc:sldMk cId="1492307721" sldId="299"/>
-        </pc:sldMkLst>
-      </pc:sldChg>
-      <pc:sldChg chg="del">
-        <pc:chgData name="Moore, Jacob Preston" userId="fdd3fd0f-c483-48c9-988d-7deb216763fd" providerId="ADAL" clId="{1DEC9EA4-08C1-4B16-BA96-BA475B1550BC}" dt="2020-08-23T18:23:16.895" v="50" actId="2696"/>
-        <pc:sldMkLst>
-          <pc:docMk/>
-          <pc:sldMk cId="3714287723" sldId="300"/>
-        </pc:sldMkLst>
-      </pc:sldChg>
-      <pc:sldChg chg="del">
-        <pc:chgData name="Moore, Jacob Preston" userId="fdd3fd0f-c483-48c9-988d-7deb216763fd" providerId="ADAL" clId="{1DEC9EA4-08C1-4B16-BA96-BA475B1550BC}" dt="2020-08-23T18:23:16.909" v="52" actId="2696"/>
-        <pc:sldMkLst>
-          <pc:docMk/>
-          <pc:sldMk cId="3819238583" sldId="301"/>
-        </pc:sldMkLst>
-      </pc:sldChg>
-      <pc:sldChg chg="del">
-        <pc:chgData name="Moore, Jacob Preston" userId="fdd3fd0f-c483-48c9-988d-7deb216763fd" providerId="ADAL" clId="{1DEC9EA4-08C1-4B16-BA96-BA475B1550BC}" dt="2020-08-23T18:23:10.204" v="38" actId="2696"/>
-        <pc:sldMkLst>
-          <pc:docMk/>
-          <pc:sldMk cId="3189583828" sldId="302"/>
-        </pc:sldMkLst>
+        <pc:spChg chg="mod">
+          <ac:chgData name="Moore, Jacob Preston" userId="fdd3fd0f-c483-48c9-988d-7deb216763fd" providerId="ADAL" clId="{A3E22C7C-4C51-4CF8-80D5-877CD6E8A6D1}" dt="2020-08-21T15:23:02.457" v="353" actId="26606"/>
+          <ac:spMkLst>
+            <pc:docMk/>
+            <pc:sldMk cId="80664795" sldId="321"/>
+            <ac:spMk id="2" creationId="{4000E0A5-F637-4430-B45D-6EC450B1E628}"/>
+          </ac:spMkLst>
+        </pc:spChg>
+        <pc:spChg chg="mod">
+          <ac:chgData name="Moore, Jacob Preston" userId="fdd3fd0f-c483-48c9-988d-7deb216763fd" providerId="ADAL" clId="{A3E22C7C-4C51-4CF8-80D5-877CD6E8A6D1}" dt="2020-08-21T15:23:22.775" v="354" actId="26606"/>
+          <ac:spMkLst>
+            <pc:docMk/>
+            <pc:sldMk cId="80664795" sldId="321"/>
+            <ac:spMk id="3" creationId="{FAB4611A-B3D6-43D0-8970-DBA8207356B3}"/>
+          </ac:spMkLst>
+        </pc:spChg>
+        <pc:spChg chg="mod">
+          <ac:chgData name="Moore, Jacob Preston" userId="fdd3fd0f-c483-48c9-988d-7deb216763fd" providerId="ADAL" clId="{A3E22C7C-4C51-4CF8-80D5-877CD6E8A6D1}" dt="2020-08-21T15:23:02.457" v="353" actId="26606"/>
+          <ac:spMkLst>
+            <pc:docMk/>
+            <pc:sldMk cId="80664795" sldId="321"/>
+            <ac:spMk id="4" creationId="{45F4EAD0-0A6C-4725-9ED6-726F57E11D40}"/>
+          </ac:spMkLst>
+        </pc:spChg>
+        <pc:picChg chg="add mod ord">
+          <ac:chgData name="Moore, Jacob Preston" userId="fdd3fd0f-c483-48c9-988d-7deb216763fd" providerId="ADAL" clId="{A3E22C7C-4C51-4CF8-80D5-877CD6E8A6D1}" dt="2020-08-21T15:23:22.775" v="354" actId="26606"/>
+          <ac:picMkLst>
+            <pc:docMk/>
+            <pc:sldMk cId="80664795" sldId="321"/>
+            <ac:picMk id="1026" creationId="{BD40B29A-BEC1-4385-86EA-F04B4EB9A933}"/>
+          </ac:picMkLst>
+        </pc:picChg>
       </pc:sldChg>
     </pc:docChg>
   </pc:docChgLst>
   <pc:docChgLst>
-    <pc:chgData name="Moore, Jacob Preston" userId="fdd3fd0f-c483-48c9-988d-7deb216763fd" providerId="ADAL" clId="{B19E1BD0-F712-4867-B478-84220143970B}"/>
-    <pc:docChg chg="custSel addSld modSld">
-      <pc:chgData name="Moore, Jacob Preston" userId="fdd3fd0f-c483-48c9-988d-7deb216763fd" providerId="ADAL" clId="{B19E1BD0-F712-4867-B478-84220143970B}" dt="2020-08-23T18:33:19.737" v="363"/>
+    <pc:chgData name="Moore, Jacob Preston" userId="fdd3fd0f-c483-48c9-988d-7deb216763fd" providerId="ADAL" clId="{1C3D8284-AEA8-4EED-95A7-E4830532795F}"/>
+    <pc:docChg chg="custSel modSld">
+      <pc:chgData name="Moore, Jacob Preston" userId="fdd3fd0f-c483-48c9-988d-7deb216763fd" providerId="ADAL" clId="{1C3D8284-AEA8-4EED-95A7-E4830532795F}" dt="2020-09-01T20:22:20.252" v="754" actId="20577"/>
       <pc:docMkLst>
         <pc:docMk/>
       </pc:docMkLst>
-      <pc:sldChg chg="modSp">
-        <pc:chgData name="Moore, Jacob Preston" userId="fdd3fd0f-c483-48c9-988d-7deb216763fd" providerId="ADAL" clId="{B19E1BD0-F712-4867-B478-84220143970B}" dt="2020-08-23T18:29:46.149" v="135" actId="27636"/>
+      <pc:sldChg chg="modAnim">
+        <pc:chgData name="Moore, Jacob Preston" userId="fdd3fd0f-c483-48c9-988d-7deb216763fd" providerId="ADAL" clId="{1C3D8284-AEA8-4EED-95A7-E4830532795F}" dt="2020-08-21T15:39:53.757" v="560"/>
         <pc:sldMkLst>
           <pc:docMk/>
-          <pc:sldMk cId="1790905930" sldId="292"/>
+          <pc:sldMk cId="1496043169" sldId="318"/>
+        </pc:sldMkLst>
+      </pc:sldChg>
+      <pc:sldChg chg="modSp modAnim">
+        <pc:chgData name="Moore, Jacob Preston" userId="fdd3fd0f-c483-48c9-988d-7deb216763fd" providerId="ADAL" clId="{1C3D8284-AEA8-4EED-95A7-E4830532795F}" dt="2020-08-21T15:40:51.073" v="565" actId="208"/>
+        <pc:sldMkLst>
+          <pc:docMk/>
+          <pc:sldMk cId="3724594762" sldId="319"/>
         </pc:sldMkLst>
         <pc:spChg chg="mod">
-          <ac:chgData name="Moore, Jacob Preston" userId="fdd3fd0f-c483-48c9-988d-7deb216763fd" providerId="ADAL" clId="{B19E1BD0-F712-4867-B478-84220143970B}" dt="2020-08-23T18:29:46.149" v="135" actId="27636"/>
+          <ac:chgData name="Moore, Jacob Preston" userId="fdd3fd0f-c483-48c9-988d-7deb216763fd" providerId="ADAL" clId="{1C3D8284-AEA8-4EED-95A7-E4830532795F}" dt="2020-08-21T15:31:56.757" v="40" actId="20577"/>
           <ac:spMkLst>
             <pc:docMk/>
-            <pc:sldMk cId="1790905930" sldId="292"/>
+            <pc:sldMk cId="3724594762" sldId="319"/>
+            <ac:spMk id="2" creationId="{00000000-0000-0000-0000-000000000000}"/>
+          </ac:spMkLst>
+        </pc:spChg>
+        <pc:spChg chg="mod">
+          <ac:chgData name="Moore, Jacob Preston" userId="fdd3fd0f-c483-48c9-988d-7deb216763fd" providerId="ADAL" clId="{1C3D8284-AEA8-4EED-95A7-E4830532795F}" dt="2020-08-21T15:38:30.537" v="556" actId="20577"/>
+          <ac:spMkLst>
+            <pc:docMk/>
+            <pc:sldMk cId="3724594762" sldId="319"/>
             <ac:spMk id="3" creationId="{00000000-0000-0000-0000-000000000000}"/>
           </ac:spMkLst>
         </pc:spChg>
-        <pc:picChg chg="mod">
-          <ac:chgData name="Moore, Jacob Preston" userId="fdd3fd0f-c483-48c9-988d-7deb216763fd" providerId="ADAL" clId="{B19E1BD0-F712-4867-B478-84220143970B}" dt="2020-08-23T18:29:43.797" v="133" actId="1076"/>
+        <pc:spChg chg="mod">
+          <ac:chgData name="Moore, Jacob Preston" userId="fdd3fd0f-c483-48c9-988d-7deb216763fd" providerId="ADAL" clId="{1C3D8284-AEA8-4EED-95A7-E4830532795F}" dt="2020-08-21T15:40:51.073" v="565" actId="208"/>
+          <ac:spMkLst>
+            <pc:docMk/>
+            <pc:sldMk cId="3724594762" sldId="319"/>
+            <ac:spMk id="5" creationId="{00000000-0000-0000-0000-000000000000}"/>
+          </ac:spMkLst>
+        </pc:spChg>
+      </pc:sldChg>
+      <pc:sldChg chg="addSp delSp modSp modAnim">
+        <pc:chgData name="Moore, Jacob Preston" userId="fdd3fd0f-c483-48c9-988d-7deb216763fd" providerId="ADAL" clId="{1C3D8284-AEA8-4EED-95A7-E4830532795F}" dt="2020-08-21T15:42:38.744" v="569" actId="1076"/>
+        <pc:sldMkLst>
+          <pc:docMk/>
+          <pc:sldMk cId="3535607454" sldId="320"/>
+        </pc:sldMkLst>
+        <pc:spChg chg="mod">
+          <ac:chgData name="Moore, Jacob Preston" userId="fdd3fd0f-c483-48c9-988d-7deb216763fd" providerId="ADAL" clId="{1C3D8284-AEA8-4EED-95A7-E4830532795F}" dt="2020-08-21T15:38:40.066" v="557" actId="113"/>
+          <ac:spMkLst>
+            <pc:docMk/>
+            <pc:sldMk cId="3535607454" sldId="320"/>
+            <ac:spMk id="3" creationId="{00000000-0000-0000-0000-000000000000}"/>
+          </ac:spMkLst>
+        </pc:spChg>
+        <pc:picChg chg="del">
+          <ac:chgData name="Moore, Jacob Preston" userId="fdd3fd0f-c483-48c9-988d-7deb216763fd" providerId="ADAL" clId="{1C3D8284-AEA8-4EED-95A7-E4830532795F}" dt="2020-08-21T15:34:10.608" v="45" actId="478"/>
           <ac:picMkLst>
             <pc:docMk/>
-            <pc:sldMk cId="1790905930" sldId="292"/>
+            <pc:sldMk cId="3535607454" sldId="320"/>
             <ac:picMk id="5" creationId="{00000000-0000-0000-0000-000000000000}"/>
           </ac:picMkLst>
         </pc:picChg>
+        <pc:picChg chg="add mod">
+          <ac:chgData name="Moore, Jacob Preston" userId="fdd3fd0f-c483-48c9-988d-7deb216763fd" providerId="ADAL" clId="{1C3D8284-AEA8-4EED-95A7-E4830532795F}" dt="2020-08-21T15:42:38.744" v="569" actId="1076"/>
+          <ac:picMkLst>
+            <pc:docMk/>
+            <pc:sldMk cId="3535607454" sldId="320"/>
+            <ac:picMk id="6" creationId="{414E10B5-0A4E-42A2-8B43-5E93C5477A1F}"/>
+          </ac:picMkLst>
+        </pc:picChg>
+        <pc:picChg chg="add del mod">
+          <ac:chgData name="Moore, Jacob Preston" userId="fdd3fd0f-c483-48c9-988d-7deb216763fd" providerId="ADAL" clId="{1C3D8284-AEA8-4EED-95A7-E4830532795F}" dt="2020-08-21T15:42:35.759" v="568" actId="478"/>
+          <ac:picMkLst>
+            <pc:docMk/>
+            <pc:sldMk cId="3535607454" sldId="320"/>
+            <ac:picMk id="8" creationId="{8C81D8CE-81CC-40DC-B765-876D28E83664}"/>
+          </ac:picMkLst>
+        </pc:picChg>
+        <pc:picChg chg="del">
+          <ac:chgData name="Moore, Jacob Preston" userId="fdd3fd0f-c483-48c9-988d-7deb216763fd" providerId="ADAL" clId="{1C3D8284-AEA8-4EED-95A7-E4830532795F}" dt="2020-08-21T15:33:50.089" v="41" actId="478"/>
+          <ac:picMkLst>
+            <pc:docMk/>
+            <pc:sldMk cId="3535607454" sldId="320"/>
+            <ac:picMk id="1026" creationId="{00000000-0000-0000-0000-000000000000}"/>
+          </ac:picMkLst>
+        </pc:picChg>
       </pc:sldChg>
-      <pc:sldChg chg="addSp modSp add modAnim">
-        <pc:chgData name="Moore, Jacob Preston" userId="fdd3fd0f-c483-48c9-988d-7deb216763fd" providerId="ADAL" clId="{B19E1BD0-F712-4867-B478-84220143970B}" dt="2020-08-23T18:33:19.737" v="363"/>
+      <pc:sldChg chg="modSp modAnim">
+        <pc:chgData name="Moore, Jacob Preston" userId="fdd3fd0f-c483-48c9-988d-7deb216763fd" providerId="ADAL" clId="{1C3D8284-AEA8-4EED-95A7-E4830532795F}" dt="2020-09-01T20:22:20.252" v="754" actId="20577"/>
         <pc:sldMkLst>
           <pc:docMk/>
-          <pc:sldMk cId="1673826892" sldId="293"/>
+          <pc:sldMk cId="80664795" sldId="321"/>
         </pc:sldMkLst>
         <pc:spChg chg="mod">
-          <ac:chgData name="Moore, Jacob Preston" userId="fdd3fd0f-c483-48c9-988d-7deb216763fd" providerId="ADAL" clId="{B19E1BD0-F712-4867-B478-84220143970B}" dt="2020-08-23T18:28:10.118" v="36" actId="20577"/>
+          <ac:chgData name="Moore, Jacob Preston" userId="fdd3fd0f-c483-48c9-988d-7deb216763fd" providerId="ADAL" clId="{1C3D8284-AEA8-4EED-95A7-E4830532795F}" dt="2020-09-01T20:22:20.252" v="754" actId="20577"/>
           <ac:spMkLst>
             <pc:docMk/>
-            <pc:sldMk cId="1673826892" sldId="293"/>
-            <ac:spMk id="2" creationId="{0B79660A-5AA3-4CBA-9708-885D2E381EDC}"/>
+            <pc:sldMk cId="80664795" sldId="321"/>
+            <ac:spMk id="3" creationId="{FAB4611A-B3D6-43D0-8970-DBA8207356B3}"/>
           </ac:spMkLst>
         </pc:spChg>
-        <pc:spChg chg="mod">
-          <ac:chgData name="Moore, Jacob Preston" userId="fdd3fd0f-c483-48c9-988d-7deb216763fd" providerId="ADAL" clId="{B19E1BD0-F712-4867-B478-84220143970B}" dt="2020-08-23T18:32:57.102" v="359" actId="113"/>
-          <ac:spMkLst>
-            <pc:docMk/>
-            <pc:sldMk cId="1673826892" sldId="293"/>
-            <ac:spMk id="3" creationId="{7493D6F3-70FE-4808-9D14-9BEB02C1461D}"/>
-          </ac:spMkLst>
-        </pc:spChg>
-        <pc:picChg chg="add mod">
-          <ac:chgData name="Moore, Jacob Preston" userId="fdd3fd0f-c483-48c9-988d-7deb216763fd" providerId="ADAL" clId="{B19E1BD0-F712-4867-B478-84220143970B}" dt="2020-08-23T18:33:09.149" v="361" actId="1076"/>
-          <ac:picMkLst>
-            <pc:docMk/>
-            <pc:sldMk cId="1673826892" sldId="293"/>
-            <ac:picMk id="1026" creationId="{5C8C8E4C-C20F-4D3A-ACE6-42AB8B89E56A}"/>
-          </ac:picMkLst>
-        </pc:picChg>
       </pc:sldChg>
     </pc:docChg>
   </pc:docChgLst>
@@ -461,7 +524,7 @@
           <a:p>
             <a:fld id="{1AA1AB63-216F-4D5B-8811-CCB935E98D4A}" type="datetimeFigureOut">
               <a:rPr lang="en-US" smtClean="0"/>
-              <a:t>8/23/2020</a:t>
+              <a:t>9/1/2020</a:t>
             </a:fld>
             <a:endParaRPr lang="en-US"/>
           </a:p>
@@ -3911,7 +3974,7 @@
           <a:p>
             <a:r>
               <a:rPr lang="en-US" dirty="0"/>
-              <a:t>Newton’s First Law of Motion</a:t>
+              <a:t>Moments</a:t>
             </a:r>
           </a:p>
         </p:txBody>
@@ -3999,7 +4062,7 @@
           <a:p>
             <a:r>
               <a:rPr lang="en-US" dirty="0"/>
-              <a:t>Newton’s First Law</a:t>
+              <a:t>Moments</a:t>
             </a:r>
           </a:p>
         </p:txBody>
@@ -4014,26 +4077,37 @@
             <p:ph idx="1"/>
           </p:nvPr>
         </p:nvSpPr>
-        <p:spPr/>
-        <p:txBody>
-          <a:bodyPr/>
+        <p:spPr>
+          <a:xfrm>
+            <a:off x="457200" y="1600200"/>
+            <a:ext cx="8229600" cy="4571999"/>
+          </a:xfrm>
+        </p:spPr>
+        <p:txBody>
+          <a:bodyPr>
+            <a:normAutofit/>
+          </a:bodyPr>
           <a:lstStyle/>
           <a:p>
             <a:r>
               <a:rPr lang="en-US" dirty="0"/>
-              <a:t>Newton’s First Law states that...</a:t>
-            </a:r>
-          </a:p>
-          <a:p>
-            <a:endParaRPr lang="en-US" dirty="0"/>
-          </a:p>
-          <a:p>
-            <a:pPr marL="0" indent="0">
-              <a:buNone/>
-            </a:pPr>
+              <a:t>A </a:t>
+            </a:r>
             <a:r>
               <a:rPr lang="en-US" b="1" dirty="0"/>
-              <a:t>“A body at rest will remain at rest unless acted on by an unbalanced force. A body in motion continues in motion with the same speed and in the same direction unless acted upon by an unbalanced force”</a:t>
+              <a:t>moment of a force </a:t>
+            </a:r>
+            <a:r>
+              <a:rPr lang="en-US" dirty="0"/>
+              <a:t>is the tendency of that force to cause a rotation of a body in the form of an </a:t>
+            </a:r>
+            <a:r>
+              <a:rPr lang="en-US" b="1" dirty="0"/>
+              <a:t>angular acceleration</a:t>
+            </a:r>
+            <a:r>
+              <a:rPr lang="en-US" dirty="0"/>
+              <a:t>.</a:t>
             </a:r>
           </a:p>
         </p:txBody>
@@ -4061,221 +4135,51 @@
           </a:p>
         </p:txBody>
       </p:sp>
+      <p:pic>
+        <p:nvPicPr>
+          <p:cNvPr id="1026" name="Picture 2" descr="The tendancy of a force to rotate a body"/>
+          <p:cNvPicPr>
+            <a:picLocks noChangeAspect="1" noChangeArrowheads="1"/>
+          </p:cNvPicPr>
+          <p:nvPr/>
+        </p:nvPicPr>
+        <p:blipFill>
+          <a:blip r:embed="rId2">
+            <a:extLst>
+              <a:ext uri="{28A0092B-C50C-407E-A947-70E740481C1C}">
+                <a14:useLocalDpi xmlns:a14="http://schemas.microsoft.com/office/drawing/2010/main" val="0"/>
+              </a:ext>
+            </a:extLst>
+          </a:blip>
+          <a:srcRect/>
+          <a:stretch>
+            <a:fillRect/>
+          </a:stretch>
+        </p:blipFill>
+        <p:spPr bwMode="auto">
+          <a:xfrm>
+            <a:off x="1143000" y="3505200"/>
+            <a:ext cx="7054780" cy="3209925"/>
+          </a:xfrm>
+          <a:prstGeom prst="rect">
+            <a:avLst/>
+          </a:prstGeom>
+          <a:noFill/>
+          <a:extLst>
+            <a:ext uri="{909E8E84-426E-40DD-AFC4-6F175D3DCCD1}">
+              <a14:hiddenFill xmlns:a14="http://schemas.microsoft.com/office/drawing/2010/main">
+                <a:solidFill>
+                  <a:srgbClr val="FFFFFF"/>
+                </a:solidFill>
+              </a14:hiddenFill>
+            </a:ext>
+          </a:extLst>
+        </p:spPr>
+      </p:pic>
     </p:spTree>
     <p:extLst>
       <p:ext uri="{BB962C8B-B14F-4D97-AF65-F5344CB8AC3E}">
-        <p14:creationId xmlns:p14="http://schemas.microsoft.com/office/powerpoint/2010/main" val="3642683568"/>
-      </p:ext>
-    </p:extLst>
-  </p:cSld>
-  <p:clrMapOvr>
-    <a:masterClrMapping/>
-  </p:clrMapOvr>
-  <p:timing>
-    <p:tnLst>
-      <p:par>
-        <p:cTn id="1" dur="indefinite" restart="never" nodeType="tmRoot">
-          <p:childTnLst>
-            <p:seq concurrent="1" nextAc="seek">
-              <p:cTn id="2" dur="indefinite" nodeType="mainSeq">
-                <p:childTnLst>
-                  <p:par>
-                    <p:cTn id="3" fill="hold">
-                      <p:stCondLst>
-                        <p:cond delay="indefinite"/>
-                      </p:stCondLst>
-                      <p:childTnLst>
-                        <p:par>
-                          <p:cTn id="4" fill="hold">
-                            <p:stCondLst>
-                              <p:cond delay="0"/>
-                            </p:stCondLst>
-                            <p:childTnLst>
-                              <p:par>
-                                <p:cTn id="5" presetID="10" presetClass="entr" presetSubtype="0" fill="hold" nodeType="clickEffect">
-                                  <p:stCondLst>
-                                    <p:cond delay="0"/>
-                                  </p:stCondLst>
-                                  <p:childTnLst>
-                                    <p:set>
-                                      <p:cBhvr>
-                                        <p:cTn id="6" dur="1" fill="hold">
-                                          <p:stCondLst>
-                                            <p:cond delay="0"/>
-                                          </p:stCondLst>
-                                        </p:cTn>
-                                        <p:tgtEl>
-                                          <p:spTgt spid="3">
-                                            <p:txEl>
-                                              <p:pRg st="2" end="2"/>
-                                            </p:txEl>
-                                          </p:spTgt>
-                                        </p:tgtEl>
-                                        <p:attrNameLst>
-                                          <p:attrName>style.visibility</p:attrName>
-                                        </p:attrNameLst>
-                                      </p:cBhvr>
-                                      <p:to>
-                                        <p:strVal val="visible"/>
-                                      </p:to>
-                                    </p:set>
-                                    <p:animEffect transition="in" filter="fade">
-                                      <p:cBhvr>
-                                        <p:cTn id="7" dur="500"/>
-                                        <p:tgtEl>
-                                          <p:spTgt spid="3">
-                                            <p:txEl>
-                                              <p:pRg st="2" end="2"/>
-                                            </p:txEl>
-                                          </p:spTgt>
-                                        </p:tgtEl>
-                                      </p:cBhvr>
-                                    </p:animEffect>
-                                  </p:childTnLst>
-                                </p:cTn>
-                              </p:par>
-                            </p:childTnLst>
-                          </p:cTn>
-                        </p:par>
-                      </p:childTnLst>
-                    </p:cTn>
-                  </p:par>
-                </p:childTnLst>
-              </p:cTn>
-              <p:prevCondLst>
-                <p:cond evt="onPrev" delay="0">
-                  <p:tgtEl>
-                    <p:sldTgt/>
-                  </p:tgtEl>
-                </p:cond>
-              </p:prevCondLst>
-              <p:nextCondLst>
-                <p:cond evt="onNext" delay="0">
-                  <p:tgtEl>
-                    <p:sldTgt/>
-                  </p:tgtEl>
-                </p:cond>
-              </p:nextCondLst>
-            </p:seq>
-          </p:childTnLst>
-        </p:cTn>
-      </p:par>
-    </p:tnLst>
-  </p:timing>
-</p:sld>
-</file>
-
-<file path=ppt/slides/slide3.xml><?xml version="1.0" encoding="utf-8"?>
-<p:sld xmlns:a="http://schemas.openxmlformats.org/drawingml/2006/main" xmlns:r="http://schemas.openxmlformats.org/officeDocument/2006/relationships" xmlns:p="http://schemas.openxmlformats.org/presentationml/2006/main">
-  <p:cSld>
-    <p:spTree>
-      <p:nvGrpSpPr>
-        <p:cNvPr id="1" name=""/>
-        <p:cNvGrpSpPr/>
-        <p:nvPr/>
-      </p:nvGrpSpPr>
-      <p:grpSpPr>
-        <a:xfrm>
-          <a:off x="0" y="0"/>
-          <a:ext cx="0" cy="0"/>
-          <a:chOff x="0" y="0"/>
-          <a:chExt cx="0" cy="0"/>
-        </a:xfrm>
-      </p:grpSpPr>
-      <p:sp>
-        <p:nvSpPr>
-          <p:cNvPr id="2" name="Title 1"/>
-          <p:cNvSpPr>
-            <a:spLocks noGrp="1"/>
-          </p:cNvSpPr>
-          <p:nvPr>
-            <p:ph type="title"/>
-          </p:nvPr>
-        </p:nvSpPr>
-        <p:spPr/>
-        <p:txBody>
-          <a:bodyPr/>
-          <a:lstStyle/>
-          <a:p>
-            <a:r>
-              <a:rPr lang="en-US" dirty="0"/>
-              <a:t>Pre-Newton’s First Law</a:t>
-            </a:r>
-          </a:p>
-        </p:txBody>
-      </p:sp>
-      <p:sp>
-        <p:nvSpPr>
-          <p:cNvPr id="3" name="Content Placeholder 2"/>
-          <p:cNvSpPr>
-            <a:spLocks noGrp="1"/>
-          </p:cNvSpPr>
-          <p:nvPr>
-            <p:ph idx="1"/>
-          </p:nvPr>
-        </p:nvSpPr>
-        <p:spPr/>
-        <p:txBody>
-          <a:bodyPr/>
-          <a:lstStyle/>
-          <a:p>
-            <a:r>
-              <a:rPr lang="en-US" dirty="0"/>
-              <a:t>Prior to Newton, a popular theory of motion was the Aristotelian theory of motion.</a:t>
-            </a:r>
-          </a:p>
-          <a:p>
-            <a:endParaRPr lang="en-US" dirty="0"/>
-          </a:p>
-          <a:p>
-            <a:r>
-              <a:rPr lang="en-US" dirty="0"/>
-              <a:t>In this theory...</a:t>
-            </a:r>
-          </a:p>
-          <a:p>
-            <a:pPr lvl="1"/>
-            <a:r>
-              <a:rPr lang="en-US" dirty="0"/>
-              <a:t>Bodies were naturally at rest, and moving bodies will eventually return to rest if left undisturbed.</a:t>
-            </a:r>
-          </a:p>
-          <a:p>
-            <a:pPr lvl="1"/>
-            <a:r>
-              <a:rPr lang="en-US" dirty="0"/>
-              <a:t>Continued motion requires the continued action of a force.</a:t>
-            </a:r>
-          </a:p>
-        </p:txBody>
-      </p:sp>
-      <p:sp>
-        <p:nvSpPr>
-          <p:cNvPr id="4" name="Slide Number Placeholder 3"/>
-          <p:cNvSpPr>
-            <a:spLocks noGrp="1"/>
-          </p:cNvSpPr>
-          <p:nvPr>
-            <p:ph type="sldNum" sz="quarter" idx="12"/>
-          </p:nvPr>
-        </p:nvSpPr>
-        <p:spPr/>
-        <p:txBody>
-          <a:bodyPr/>
-          <a:lstStyle/>
-          <a:p>
-            <a:fld id="{929262FE-7F58-4A1E-8AF3-5A510A86DEBD}" type="slidenum">
-              <a:rPr lang="en-US" smtClean="0"/>
-              <a:t>3</a:t>
-            </a:fld>
-            <a:endParaRPr lang="en-US"/>
-          </a:p>
-        </p:txBody>
-      </p:sp>
-    </p:spTree>
-    <p:extLst>
-      <p:ext uri="{BB962C8B-B14F-4D97-AF65-F5344CB8AC3E}">
-        <p14:creationId xmlns:p14="http://schemas.microsoft.com/office/powerpoint/2010/main" val="2525870602"/>
+        <p14:creationId xmlns:p14="http://schemas.microsoft.com/office/powerpoint/2010/main" val="3576391048"/>
       </p:ext>
     </p:extLst>
   </p:cSld>
@@ -4377,11 +4281,7 @@
                                           </p:stCondLst>
                                         </p:cTn>
                                         <p:tgtEl>
-                                          <p:spTgt spid="3">
-                                            <p:txEl>
-                                              <p:pRg st="2" end="2"/>
-                                            </p:txEl>
-                                          </p:spTgt>
+                                          <p:spTgt spid="1026"/>
                                         </p:tgtEl>
                                         <p:attrNameLst>
                                           <p:attrName>style.visibility</p:attrName>
@@ -4395,133 +4295,7 @@
                                       <p:cBhvr>
                                         <p:cTn id="12" dur="500"/>
                                         <p:tgtEl>
-                                          <p:spTgt spid="3">
-                                            <p:txEl>
-                                              <p:pRg st="2" end="2"/>
-                                            </p:txEl>
-                                          </p:spTgt>
-                                        </p:tgtEl>
-                                      </p:cBhvr>
-                                    </p:animEffect>
-                                  </p:childTnLst>
-                                </p:cTn>
-                              </p:par>
-                            </p:childTnLst>
-                          </p:cTn>
-                        </p:par>
-                      </p:childTnLst>
-                    </p:cTn>
-                  </p:par>
-                  <p:par>
-                    <p:cTn id="13" fill="hold">
-                      <p:stCondLst>
-                        <p:cond delay="indefinite"/>
-                      </p:stCondLst>
-                      <p:childTnLst>
-                        <p:par>
-                          <p:cTn id="14" fill="hold">
-                            <p:stCondLst>
-                              <p:cond delay="0"/>
-                            </p:stCondLst>
-                            <p:childTnLst>
-                              <p:par>
-                                <p:cTn id="15" presetID="10" presetClass="entr" presetSubtype="0" fill="hold" nodeType="clickEffect">
-                                  <p:stCondLst>
-                                    <p:cond delay="0"/>
-                                  </p:stCondLst>
-                                  <p:childTnLst>
-                                    <p:set>
-                                      <p:cBhvr>
-                                        <p:cTn id="16" dur="1" fill="hold">
-                                          <p:stCondLst>
-                                            <p:cond delay="0"/>
-                                          </p:stCondLst>
-                                        </p:cTn>
-                                        <p:tgtEl>
-                                          <p:spTgt spid="3">
-                                            <p:txEl>
-                                              <p:pRg st="3" end="3"/>
-                                            </p:txEl>
-                                          </p:spTgt>
-                                        </p:tgtEl>
-                                        <p:attrNameLst>
-                                          <p:attrName>style.visibility</p:attrName>
-                                        </p:attrNameLst>
-                                      </p:cBhvr>
-                                      <p:to>
-                                        <p:strVal val="visible"/>
-                                      </p:to>
-                                    </p:set>
-                                    <p:animEffect transition="in" filter="fade">
-                                      <p:cBhvr>
-                                        <p:cTn id="17" dur="500"/>
-                                        <p:tgtEl>
-                                          <p:spTgt spid="3">
-                                            <p:txEl>
-                                              <p:pRg st="3" end="3"/>
-                                            </p:txEl>
-                                          </p:spTgt>
-                                        </p:tgtEl>
-                                      </p:cBhvr>
-                                    </p:animEffect>
-                                  </p:childTnLst>
-                                </p:cTn>
-                              </p:par>
-                            </p:childTnLst>
-                          </p:cTn>
-                        </p:par>
-                      </p:childTnLst>
-                    </p:cTn>
-                  </p:par>
-                  <p:par>
-                    <p:cTn id="18" fill="hold">
-                      <p:stCondLst>
-                        <p:cond delay="indefinite"/>
-                      </p:stCondLst>
-                      <p:childTnLst>
-                        <p:par>
-                          <p:cTn id="19" fill="hold">
-                            <p:stCondLst>
-                              <p:cond delay="0"/>
-                            </p:stCondLst>
-                            <p:childTnLst>
-                              <p:par>
-                                <p:cTn id="20" presetID="10" presetClass="entr" presetSubtype="0" fill="hold" nodeType="clickEffect">
-                                  <p:stCondLst>
-                                    <p:cond delay="0"/>
-                                  </p:stCondLst>
-                                  <p:childTnLst>
-                                    <p:set>
-                                      <p:cBhvr>
-                                        <p:cTn id="21" dur="1" fill="hold">
-                                          <p:stCondLst>
-                                            <p:cond delay="0"/>
-                                          </p:stCondLst>
-                                        </p:cTn>
-                                        <p:tgtEl>
-                                          <p:spTgt spid="3">
-                                            <p:txEl>
-                                              <p:pRg st="4" end="4"/>
-                                            </p:txEl>
-                                          </p:spTgt>
-                                        </p:tgtEl>
-                                        <p:attrNameLst>
-                                          <p:attrName>style.visibility</p:attrName>
-                                        </p:attrNameLst>
-                                      </p:cBhvr>
-                                      <p:to>
-                                        <p:strVal val="visible"/>
-                                      </p:to>
-                                    </p:set>
-                                    <p:animEffect transition="in" filter="fade">
-                                      <p:cBhvr>
-                                        <p:cTn id="22" dur="500"/>
-                                        <p:tgtEl>
-                                          <p:spTgt spid="3">
-                                            <p:txEl>
-                                              <p:pRg st="4" end="4"/>
-                                            </p:txEl>
-                                          </p:spTgt>
+                                          <p:spTgt spid="1026"/>
                                         </p:tgtEl>
                                       </p:cBhvr>
                                     </p:animEffect>
@@ -4559,7 +4333,7 @@
 </p:sld>
 </file>
 
-<file path=ppt/slides/slide4.xml><?xml version="1.0" encoding="utf-8"?>
+<file path=ppt/slides/slide3.xml><?xml version="1.0" encoding="utf-8"?>
 <p:sld xmlns:a="http://schemas.openxmlformats.org/drawingml/2006/main" xmlns:r="http://schemas.openxmlformats.org/officeDocument/2006/relationships" xmlns:p="http://schemas.openxmlformats.org/presentationml/2006/main">
   <p:cSld>
     <p:spTree>
@@ -4578,7 +4352,13 @@
       </p:grpSpPr>
       <p:sp>
         <p:nvSpPr>
-          <p:cNvPr id="2" name="Title 1"/>
+          <p:cNvPr id="2" name="Title 1">
+            <a:extLst>
+              <a:ext uri="{FF2B5EF4-FFF2-40B4-BE49-F238E27FC236}">
+                <a16:creationId xmlns:a16="http://schemas.microsoft.com/office/drawing/2014/main" id="{4000E0A5-F637-4430-B45D-6EC450B1E628}"/>
+              </a:ext>
+            </a:extLst>
+          </p:cNvPr>
           <p:cNvSpPr>
             <a:spLocks noGrp="1"/>
           </p:cNvSpPr>
@@ -4586,105 +4366,110 @@
             <p:ph type="title"/>
           </p:nvPr>
         </p:nvSpPr>
-        <p:spPr/>
-        <p:txBody>
-          <a:bodyPr/>
+        <p:spPr>
+          <a:xfrm>
+            <a:off x="457200" y="274638"/>
+            <a:ext cx="8229600" cy="1143000"/>
+          </a:xfrm>
+        </p:spPr>
+        <p:txBody>
+          <a:bodyPr anchor="ctr">
+            <a:normAutofit/>
+          </a:bodyPr>
           <a:lstStyle/>
           <a:p>
             <a:r>
               <a:rPr lang="en-US" dirty="0"/>
-              <a:t>Newton’s First Law</a:t>
-            </a:r>
-          </a:p>
-        </p:txBody>
-      </p:sp>
-      <p:sp>
-        <p:nvSpPr>
-          <p:cNvPr id="3" name="Content Placeholder 2"/>
-          <p:cNvSpPr>
-            <a:spLocks noGrp="1"/>
-          </p:cNvSpPr>
-          <p:nvPr>
-            <p:ph idx="1"/>
+              <a:t>Pure Moments</a:t>
+            </a:r>
+          </a:p>
+        </p:txBody>
+      </p:sp>
+      <p:sp>
+        <p:nvSpPr>
+          <p:cNvPr id="3" name="Content Placeholder 2">
+            <a:extLst>
+              <a:ext uri="{FF2B5EF4-FFF2-40B4-BE49-F238E27FC236}">
+                <a16:creationId xmlns:a16="http://schemas.microsoft.com/office/drawing/2014/main" id="{FAB4611A-B3D6-43D0-8970-DBA8207356B3}"/>
+              </a:ext>
+            </a:extLst>
+          </p:cNvPr>
+          <p:cNvSpPr>
+            <a:spLocks noGrp="1"/>
+          </p:cNvSpPr>
+          <p:nvPr>
+            <p:ph sz="half" idx="1"/>
           </p:nvPr>
         </p:nvSpPr>
         <p:spPr>
           <a:xfrm>
             <a:off x="457200" y="1600200"/>
-            <a:ext cx="5715000" cy="4525963"/>
+            <a:ext cx="4038600" cy="4525963"/>
           </a:xfrm>
         </p:spPr>
         <p:txBody>
           <a:bodyPr>
-            <a:normAutofit fontScale="85000" lnSpcReduction="10000"/>
+            <a:normAutofit lnSpcReduction="10000"/>
           </a:bodyPr>
           <a:lstStyle/>
           <a:p>
             <a:r>
               <a:rPr lang="en-US" dirty="0"/>
-              <a:t>Theories agree in that bodies at rest tend to stay at rest unless acted on by a force.</a:t>
-            </a:r>
-          </a:p>
-          <a:p>
+              <a:t>In many cases, we will apply a set of forces, called a </a:t>
+            </a:r>
+            <a:r>
+              <a:rPr lang="en-US" b="1" dirty="0"/>
+              <a:t>couple</a:t>
+            </a:r>
             <a:r>
               <a:rPr lang="en-US" dirty="0"/>
-              <a:t>Theories differ in what happens to bodies in motion.</a:t>
-            </a:r>
-          </a:p>
-          <a:p>
-            <a:pPr lvl="1"/>
+              <a:t>, that will exert a moment without exerting a net force. This is called a </a:t>
+            </a:r>
+            <a:r>
+              <a:rPr lang="en-US" b="1" dirty="0"/>
+              <a:t>pure moment</a:t>
+            </a:r>
             <a:r>
               <a:rPr lang="en-US" dirty="0"/>
-              <a:t>Either stay in motion (Newton) ...</a:t>
-            </a:r>
-          </a:p>
-          <a:p>
-            <a:pPr lvl="1"/>
+              <a:t>.</a:t>
+            </a:r>
+          </a:p>
+          <a:p>
             <a:r>
               <a:rPr lang="en-US" dirty="0"/>
-              <a:t>or eventually come to rest (Aristotle)</a:t>
-            </a:r>
-          </a:p>
-          <a:p>
+              <a:t>Many devices, such as this </a:t>
+            </a:r>
+            <a:r>
+              <a:rPr lang="en-US"/>
+              <a:t>electric screwdriver, can exert </a:t>
+            </a:r>
             <a:r>
               <a:rPr lang="en-US" dirty="0"/>
-              <a:t>Friction is the key to this difference, friction is a force always working to bring objects back to a rest.</a:t>
-            </a:r>
-          </a:p>
-        </p:txBody>
-      </p:sp>
-      <p:sp>
-        <p:nvSpPr>
-          <p:cNvPr id="4" name="Slide Number Placeholder 3"/>
-          <p:cNvSpPr>
-            <a:spLocks noGrp="1"/>
-          </p:cNvSpPr>
-          <p:nvPr>
-            <p:ph type="sldNum" sz="quarter" idx="12"/>
-          </p:nvPr>
-        </p:nvSpPr>
-        <p:spPr/>
-        <p:txBody>
-          <a:bodyPr/>
-          <a:lstStyle/>
-          <a:p>
-            <a:fld id="{929262FE-7F58-4A1E-8AF3-5A510A86DEBD}" type="slidenum">
-              <a:rPr lang="en-US" smtClean="0"/>
-              <a:t>4</a:t>
-            </a:fld>
-            <a:endParaRPr lang="en-US"/>
+              <a:t>a </a:t>
+            </a:r>
+            <a:r>
+              <a:rPr lang="en-US"/>
+              <a:t>pure moment.</a:t>
+            </a:r>
+            <a:endParaRPr lang="en-US" dirty="0"/>
           </a:p>
         </p:txBody>
       </p:sp>
       <p:pic>
         <p:nvPicPr>
-          <p:cNvPr id="5" name="Picture 4" descr="Space Capsule By NASA [Public Domain]"/>
+          <p:cNvPr id="1026" name="Picture 2" descr="Crop focused ethnic engineer using electric screwdriver">
+            <a:extLst>
+              <a:ext uri="{FF2B5EF4-FFF2-40B4-BE49-F238E27FC236}">
+                <a16:creationId xmlns:a16="http://schemas.microsoft.com/office/drawing/2014/main" id="{BD40B29A-BEC1-4385-86EA-F04B4EB9A933}"/>
+              </a:ext>
+            </a:extLst>
+          </p:cNvPr>
           <p:cNvPicPr>
             <a:picLocks noChangeAspect="1" noChangeArrowheads="1"/>
           </p:cNvPicPr>
           <p:nvPr/>
         </p:nvPicPr>
-        <p:blipFill>
+        <p:blipFill rotWithShape="1">
           <a:blip r:embed="rId2">
             <a:extLst>
               <a:ext uri="{28A0092B-C50C-407E-A947-70E740481C1C}">
@@ -4692,15 +4477,13 @@
               </a:ext>
             </a:extLst>
           </a:blip>
-          <a:srcRect/>
-          <a:stretch>
-            <a:fillRect/>
-          </a:stretch>
+          <a:srcRect l="34418" r="6019" b="-1"/>
+          <a:stretch/>
         </p:blipFill>
         <p:spPr bwMode="auto">
           <a:xfrm>
-            <a:off x="6362698" y="4038600"/>
-            <a:ext cx="2381249" cy="1905000"/>
+            <a:off x="4648200" y="1600200"/>
+            <a:ext cx="4038600" cy="4525963"/>
           </a:xfrm>
           <a:prstGeom prst="rect">
             <a:avLst/>
@@ -4717,49 +4500,56 @@
           </a:extLst>
         </p:spPr>
       </p:pic>
-      <p:pic>
-        <p:nvPicPr>
-          <p:cNvPr id="6" name="Picture 2" descr="A Rock in a Field By Liz Gray [CC-BY-SA-2.0 (http://creativecommons.org/licenses/by-sa/2.0)], via Wikimedia Commons"/>
-          <p:cNvPicPr>
-            <a:picLocks noChangeAspect="1" noChangeArrowheads="1"/>
-          </p:cNvPicPr>
-          <p:nvPr/>
-        </p:nvPicPr>
-        <p:blipFill rotWithShape="1">
-          <a:blip r:embed="rId3">
+      <p:sp>
+        <p:nvSpPr>
+          <p:cNvPr id="4" name="Slide Number Placeholder 3">
             <a:extLst>
-              <a:ext uri="{28A0092B-C50C-407E-A947-70E740481C1C}">
-                <a14:useLocalDpi xmlns:a14="http://schemas.microsoft.com/office/drawing/2010/main" val="0"/>
+              <a:ext uri="{FF2B5EF4-FFF2-40B4-BE49-F238E27FC236}">
+                <a16:creationId xmlns:a16="http://schemas.microsoft.com/office/drawing/2014/main" id="{45F4EAD0-0A6C-4725-9ED6-726F57E11D40}"/>
               </a:ext>
             </a:extLst>
-          </a:blip>
-          <a:srcRect l="44506"/>
-          <a:stretch/>
-        </p:blipFill>
-        <p:spPr bwMode="auto">
+          </p:cNvPr>
+          <p:cNvSpPr>
+            <a:spLocks noGrp="1"/>
+          </p:cNvSpPr>
+          <p:nvPr>
+            <p:ph type="sldNum" sz="quarter" idx="12"/>
+          </p:nvPr>
+        </p:nvSpPr>
+        <p:spPr>
           <a:xfrm>
-            <a:off x="6549116" y="1248061"/>
-            <a:ext cx="2008412" cy="2714339"/>
+            <a:off x="6553200" y="6356350"/>
+            <a:ext cx="2133600" cy="365125"/>
           </a:xfrm>
-          <a:prstGeom prst="rect">
-            <a:avLst/>
-          </a:prstGeom>
-          <a:noFill/>
-          <a:extLst>
-            <a:ext uri="{909E8E84-426E-40DD-AFC4-6F175D3DCCD1}">
-              <a14:hiddenFill xmlns:a14="http://schemas.microsoft.com/office/drawing/2010/main">
-                <a:solidFill>
-                  <a:srgbClr val="FFFFFF"/>
-                </a:solidFill>
-              </a14:hiddenFill>
-            </a:ext>
-          </a:extLst>
         </p:spPr>
-      </p:pic>
+        <p:txBody>
+          <a:bodyPr anchor="ctr">
+            <a:normAutofit/>
+          </a:bodyPr>
+          <a:lstStyle/>
+          <a:p>
+            <a:pPr>
+              <a:spcAft>
+                <a:spcPts val="600"/>
+              </a:spcAft>
+            </a:pPr>
+            <a:fld id="{929262FE-7F58-4A1E-8AF3-5A510A86DEBD}" type="slidenum">
+              <a:rPr lang="en-US" smtClean="0"/>
+              <a:pPr>
+                <a:spcAft>
+                  <a:spcPts val="600"/>
+                </a:spcAft>
+              </a:pPr>
+              <a:t>3</a:t>
+            </a:fld>
+            <a:endParaRPr lang="en-US"/>
+          </a:p>
+        </p:txBody>
+      </p:sp>
     </p:spTree>
     <p:extLst>
       <p:ext uri="{BB962C8B-B14F-4D97-AF65-F5344CB8AC3E}">
-        <p14:creationId xmlns:p14="http://schemas.microsoft.com/office/powerpoint/2010/main" val="444073582"/>
+        <p14:creationId xmlns:p14="http://schemas.microsoft.com/office/powerpoint/2010/main" val="80664795"/>
       </p:ext>
     </p:extLst>
   </p:cSld>
@@ -4787,7 +4577,7 @@
                             </p:stCondLst>
                             <p:childTnLst>
                               <p:par>
-                                <p:cTn id="5" presetID="10" presetClass="entr" presetSubtype="0" fill="hold" nodeType="clickEffect">
+                                <p:cTn id="5" presetID="1" presetClass="entr" presetSubtype="0" fill="hold" grpId="0" nodeType="clickEffect">
                                   <p:stCondLst>
                                     <p:cond delay="0"/>
                                   </p:stCondLst>
@@ -4814,18 +4604,6 @@
                                         <p:strVal val="visible"/>
                                       </p:to>
                                     </p:set>
-                                    <p:animEffect transition="in" filter="fade">
-                                      <p:cBhvr>
-                                        <p:cTn id="7" dur="500"/>
-                                        <p:tgtEl>
-                                          <p:spTgt spid="3">
-                                            <p:txEl>
-                                              <p:pRg st="0" end="0"/>
-                                            </p:txEl>
-                                          </p:spTgt>
-                                        </p:tgtEl>
-                                      </p:cBhvr>
-                                    </p:animEffect>
                                   </p:childTnLst>
                                 </p:cTn>
                               </p:par>
@@ -4836,79 +4614,26 @@
                     </p:cTn>
                   </p:par>
                   <p:par>
-                    <p:cTn id="8" fill="hold">
+                    <p:cTn id="7" fill="hold">
                       <p:stCondLst>
                         <p:cond delay="indefinite"/>
                       </p:stCondLst>
                       <p:childTnLst>
                         <p:par>
-                          <p:cTn id="9" fill="hold">
+                          <p:cTn id="8" fill="hold">
                             <p:stCondLst>
                               <p:cond delay="0"/>
                             </p:stCondLst>
                             <p:childTnLst>
                               <p:par>
-                                <p:cTn id="10" presetID="10" presetClass="entr" presetSubtype="0" fill="hold" nodeType="clickEffect">
+                                <p:cTn id="9" presetID="1" presetClass="entr" presetSubtype="0" fill="hold" grpId="0" nodeType="clickEffect">
                                   <p:stCondLst>
                                     <p:cond delay="0"/>
                                   </p:stCondLst>
                                   <p:childTnLst>
                                     <p:set>
                                       <p:cBhvr>
-                                        <p:cTn id="11" dur="1" fill="hold">
-                                          <p:stCondLst>
-                                            <p:cond delay="0"/>
-                                          </p:stCondLst>
-                                        </p:cTn>
-                                        <p:tgtEl>
-                                          <p:spTgt spid="6"/>
-                                        </p:tgtEl>
-                                        <p:attrNameLst>
-                                          <p:attrName>style.visibility</p:attrName>
-                                        </p:attrNameLst>
-                                      </p:cBhvr>
-                                      <p:to>
-                                        <p:strVal val="visible"/>
-                                      </p:to>
-                                    </p:set>
-                                    <p:animEffect transition="in" filter="fade">
-                                      <p:cBhvr>
-                                        <p:cTn id="12" dur="500"/>
-                                        <p:tgtEl>
-                                          <p:spTgt spid="6"/>
-                                        </p:tgtEl>
-                                      </p:cBhvr>
-                                    </p:animEffect>
-                                  </p:childTnLst>
-                                </p:cTn>
-                              </p:par>
-                            </p:childTnLst>
-                          </p:cTn>
-                        </p:par>
-                      </p:childTnLst>
-                    </p:cTn>
-                  </p:par>
-                  <p:par>
-                    <p:cTn id="13" fill="hold">
-                      <p:stCondLst>
-                        <p:cond delay="indefinite"/>
-                      </p:stCondLst>
-                      <p:childTnLst>
-                        <p:par>
-                          <p:cTn id="14" fill="hold">
-                            <p:stCondLst>
-                              <p:cond delay="0"/>
-                            </p:stCondLst>
-                            <p:childTnLst>
-                              <p:par>
-                                <p:cTn id="15" presetID="10" presetClass="entr" presetSubtype="0" fill="hold" nodeType="clickEffect">
-                                  <p:stCondLst>
-                                    <p:cond delay="0"/>
-                                  </p:stCondLst>
-                                  <p:childTnLst>
-                                    <p:set>
-                                      <p:cBhvr>
-                                        <p:cTn id="16" dur="1" fill="hold">
+                                        <p:cTn id="10" dur="1" fill="hold">
                                           <p:stCondLst>
                                             <p:cond delay="0"/>
                                           </p:stCondLst>
@@ -4928,58 +4653,24 @@
                                         <p:strVal val="visible"/>
                                       </p:to>
                                     </p:set>
-                                    <p:animEffect transition="in" filter="fade">
-                                      <p:cBhvr>
-                                        <p:cTn id="17" dur="500"/>
-                                        <p:tgtEl>
-                                          <p:spTgt spid="3">
-                                            <p:txEl>
-                                              <p:pRg st="1" end="1"/>
-                                            </p:txEl>
-                                          </p:spTgt>
-                                        </p:tgtEl>
-                                      </p:cBhvr>
-                                    </p:animEffect>
                                   </p:childTnLst>
                                 </p:cTn>
                               </p:par>
-                            </p:childTnLst>
-                          </p:cTn>
-                        </p:par>
-                      </p:childTnLst>
-                    </p:cTn>
-                  </p:par>
-                  <p:par>
-                    <p:cTn id="18" fill="hold">
-                      <p:stCondLst>
-                        <p:cond delay="indefinite"/>
-                      </p:stCondLst>
-                      <p:childTnLst>
-                        <p:par>
-                          <p:cTn id="19" fill="hold">
-                            <p:stCondLst>
-                              <p:cond delay="0"/>
-                            </p:stCondLst>
-                            <p:childTnLst>
                               <p:par>
-                                <p:cTn id="20" presetID="10" presetClass="entr" presetSubtype="0" fill="hold" nodeType="clickEffect">
+                                <p:cTn id="11" presetID="10" presetClass="entr" presetSubtype="0" fill="hold" nodeType="withEffect">
                                   <p:stCondLst>
                                     <p:cond delay="0"/>
                                   </p:stCondLst>
                                   <p:childTnLst>
                                     <p:set>
                                       <p:cBhvr>
-                                        <p:cTn id="21" dur="1" fill="hold">
+                                        <p:cTn id="12" dur="1" fill="hold">
                                           <p:stCondLst>
                                             <p:cond delay="0"/>
                                           </p:stCondLst>
                                         </p:cTn>
                                         <p:tgtEl>
-                                          <p:spTgt spid="3">
-                                            <p:txEl>
-                                              <p:pRg st="2" end="2"/>
-                                            </p:txEl>
-                                          </p:spTgt>
+                                          <p:spTgt spid="1026"/>
                                         </p:tgtEl>
                                         <p:attrNameLst>
                                           <p:attrName>style.visibility</p:attrName>
@@ -4991,600 +4682,9 @@
                                     </p:set>
                                     <p:animEffect transition="in" filter="fade">
                                       <p:cBhvr>
-                                        <p:cTn id="22" dur="500"/>
+                                        <p:cTn id="13" dur="500"/>
                                         <p:tgtEl>
-                                          <p:spTgt spid="3">
-                                            <p:txEl>
-                                              <p:pRg st="2" end="2"/>
-                                            </p:txEl>
-                                          </p:spTgt>
-                                        </p:tgtEl>
-                                      </p:cBhvr>
-                                    </p:animEffect>
-                                  </p:childTnLst>
-                                </p:cTn>
-                              </p:par>
-                            </p:childTnLst>
-                          </p:cTn>
-                        </p:par>
-                      </p:childTnLst>
-                    </p:cTn>
-                  </p:par>
-                  <p:par>
-                    <p:cTn id="23" fill="hold">
-                      <p:stCondLst>
-                        <p:cond delay="indefinite"/>
-                      </p:stCondLst>
-                      <p:childTnLst>
-                        <p:par>
-                          <p:cTn id="24" fill="hold">
-                            <p:stCondLst>
-                              <p:cond delay="0"/>
-                            </p:stCondLst>
-                            <p:childTnLst>
-                              <p:par>
-                                <p:cTn id="25" presetID="10" presetClass="entr" presetSubtype="0" fill="hold" nodeType="clickEffect">
-                                  <p:stCondLst>
-                                    <p:cond delay="0"/>
-                                  </p:stCondLst>
-                                  <p:childTnLst>
-                                    <p:set>
-                                      <p:cBhvr>
-                                        <p:cTn id="26" dur="1" fill="hold">
-                                          <p:stCondLst>
-                                            <p:cond delay="0"/>
-                                          </p:stCondLst>
-                                        </p:cTn>
-                                        <p:tgtEl>
-                                          <p:spTgt spid="3">
-                                            <p:txEl>
-                                              <p:pRg st="3" end="3"/>
-                                            </p:txEl>
-                                          </p:spTgt>
-                                        </p:tgtEl>
-                                        <p:attrNameLst>
-                                          <p:attrName>style.visibility</p:attrName>
-                                        </p:attrNameLst>
-                                      </p:cBhvr>
-                                      <p:to>
-                                        <p:strVal val="visible"/>
-                                      </p:to>
-                                    </p:set>
-                                    <p:animEffect transition="in" filter="fade">
-                                      <p:cBhvr>
-                                        <p:cTn id="27" dur="500"/>
-                                        <p:tgtEl>
-                                          <p:spTgt spid="3">
-                                            <p:txEl>
-                                              <p:pRg st="3" end="3"/>
-                                            </p:txEl>
-                                          </p:spTgt>
-                                        </p:tgtEl>
-                                      </p:cBhvr>
-                                    </p:animEffect>
-                                  </p:childTnLst>
-                                </p:cTn>
-                              </p:par>
-                            </p:childTnLst>
-                          </p:cTn>
-                        </p:par>
-                      </p:childTnLst>
-                    </p:cTn>
-                  </p:par>
-                  <p:par>
-                    <p:cTn id="28" fill="hold">
-                      <p:stCondLst>
-                        <p:cond delay="indefinite"/>
-                      </p:stCondLst>
-                      <p:childTnLst>
-                        <p:par>
-                          <p:cTn id="29" fill="hold">
-                            <p:stCondLst>
-                              <p:cond delay="0"/>
-                            </p:stCondLst>
-                            <p:childTnLst>
-                              <p:par>
-                                <p:cTn id="30" presetID="10" presetClass="entr" presetSubtype="0" fill="hold" nodeType="clickEffect">
-                                  <p:stCondLst>
-                                    <p:cond delay="0"/>
-                                  </p:stCondLst>
-                                  <p:childTnLst>
-                                    <p:set>
-                                      <p:cBhvr>
-                                        <p:cTn id="31" dur="1" fill="hold">
-                                          <p:stCondLst>
-                                            <p:cond delay="0"/>
-                                          </p:stCondLst>
-                                        </p:cTn>
-                                        <p:tgtEl>
-                                          <p:spTgt spid="3">
-                                            <p:txEl>
-                                              <p:pRg st="4" end="4"/>
-                                            </p:txEl>
-                                          </p:spTgt>
-                                        </p:tgtEl>
-                                        <p:attrNameLst>
-                                          <p:attrName>style.visibility</p:attrName>
-                                        </p:attrNameLst>
-                                      </p:cBhvr>
-                                      <p:to>
-                                        <p:strVal val="visible"/>
-                                      </p:to>
-                                    </p:set>
-                                    <p:animEffect transition="in" filter="fade">
-                                      <p:cBhvr>
-                                        <p:cTn id="32" dur="500"/>
-                                        <p:tgtEl>
-                                          <p:spTgt spid="3">
-                                            <p:txEl>
-                                              <p:pRg st="4" end="4"/>
-                                            </p:txEl>
-                                          </p:spTgt>
-                                        </p:tgtEl>
-                                      </p:cBhvr>
-                                    </p:animEffect>
-                                  </p:childTnLst>
-                                </p:cTn>
-                              </p:par>
-                            </p:childTnLst>
-                          </p:cTn>
-                        </p:par>
-                      </p:childTnLst>
-                    </p:cTn>
-                  </p:par>
-                  <p:par>
-                    <p:cTn id="33" fill="hold">
-                      <p:stCondLst>
-                        <p:cond delay="indefinite"/>
-                      </p:stCondLst>
-                      <p:childTnLst>
-                        <p:par>
-                          <p:cTn id="34" fill="hold">
-                            <p:stCondLst>
-                              <p:cond delay="0"/>
-                            </p:stCondLst>
-                            <p:childTnLst>
-                              <p:par>
-                                <p:cTn id="35" presetID="10" presetClass="entr" presetSubtype="0" fill="hold" nodeType="clickEffect">
-                                  <p:stCondLst>
-                                    <p:cond delay="0"/>
-                                  </p:stCondLst>
-                                  <p:childTnLst>
-                                    <p:set>
-                                      <p:cBhvr>
-                                        <p:cTn id="36" dur="1" fill="hold">
-                                          <p:stCondLst>
-                                            <p:cond delay="0"/>
-                                          </p:stCondLst>
-                                        </p:cTn>
-                                        <p:tgtEl>
-                                          <p:spTgt spid="5"/>
-                                        </p:tgtEl>
-                                        <p:attrNameLst>
-                                          <p:attrName>style.visibility</p:attrName>
-                                        </p:attrNameLst>
-                                      </p:cBhvr>
-                                      <p:to>
-                                        <p:strVal val="visible"/>
-                                      </p:to>
-                                    </p:set>
-                                    <p:animEffect transition="in" filter="fade">
-                                      <p:cBhvr>
-                                        <p:cTn id="37" dur="500"/>
-                                        <p:tgtEl>
-                                          <p:spTgt spid="5"/>
-                                        </p:tgtEl>
-                                      </p:cBhvr>
-                                    </p:animEffect>
-                                  </p:childTnLst>
-                                </p:cTn>
-                              </p:par>
-                            </p:childTnLst>
-                          </p:cTn>
-                        </p:par>
-                      </p:childTnLst>
-                    </p:cTn>
-                  </p:par>
-                </p:childTnLst>
-              </p:cTn>
-              <p:prevCondLst>
-                <p:cond evt="onPrev" delay="0">
-                  <p:tgtEl>
-                    <p:sldTgt/>
-                  </p:tgtEl>
-                </p:cond>
-              </p:prevCondLst>
-              <p:nextCondLst>
-                <p:cond evt="onNext" delay="0">
-                  <p:tgtEl>
-                    <p:sldTgt/>
-                  </p:tgtEl>
-                </p:cond>
-              </p:nextCondLst>
-            </p:seq>
-          </p:childTnLst>
-        </p:cTn>
-      </p:par>
-    </p:tnLst>
-  </p:timing>
-</p:sld>
-</file>
-
-<file path=ppt/slides/slide5.xml><?xml version="1.0" encoding="utf-8"?>
-<p:sld xmlns:a="http://schemas.openxmlformats.org/drawingml/2006/main" xmlns:r="http://schemas.openxmlformats.org/officeDocument/2006/relationships" xmlns:p="http://schemas.openxmlformats.org/presentationml/2006/main">
-  <p:cSld>
-    <p:spTree>
-      <p:nvGrpSpPr>
-        <p:cNvPr id="1" name=""/>
-        <p:cNvGrpSpPr/>
-        <p:nvPr/>
-      </p:nvGrpSpPr>
-      <p:grpSpPr>
-        <a:xfrm>
-          <a:off x="0" y="0"/>
-          <a:ext cx="0" cy="0"/>
-          <a:chOff x="0" y="0"/>
-          <a:chExt cx="0" cy="0"/>
-        </a:xfrm>
-      </p:grpSpPr>
-      <p:sp>
-        <p:nvSpPr>
-          <p:cNvPr id="2" name="Title 1"/>
-          <p:cNvSpPr>
-            <a:spLocks noGrp="1"/>
-          </p:cNvSpPr>
-          <p:nvPr>
-            <p:ph type="title"/>
-          </p:nvPr>
-        </p:nvSpPr>
-        <p:spPr/>
-        <p:txBody>
-          <a:bodyPr>
-            <a:normAutofit fontScale="90000"/>
-          </a:bodyPr>
-          <a:lstStyle/>
-          <a:p>
-            <a:r>
-              <a:rPr lang="en-US" dirty="0"/>
-              <a:t>Newton’s First Law</a:t>
-            </a:r>
-            <a:br>
-              <a:rPr lang="en-US" dirty="0"/>
-            </a:br>
-            <a:r>
-              <a:rPr lang="en-US" dirty="0"/>
-              <a:t>and the “Net Force”</a:t>
-            </a:r>
-          </a:p>
-        </p:txBody>
-      </p:sp>
-      <p:sp>
-        <p:nvSpPr>
-          <p:cNvPr id="3" name="Content Placeholder 2"/>
-          <p:cNvSpPr>
-            <a:spLocks noGrp="1"/>
-          </p:cNvSpPr>
-          <p:nvPr>
-            <p:ph idx="1"/>
-          </p:nvPr>
-        </p:nvSpPr>
-        <p:spPr>
-          <a:xfrm>
-            <a:off x="457200" y="1600200"/>
-            <a:ext cx="5029200" cy="4756150"/>
-          </a:xfrm>
-        </p:spPr>
-        <p:txBody>
-          <a:bodyPr>
-            <a:normAutofit fontScale="85000" lnSpcReduction="20000"/>
-          </a:bodyPr>
-          <a:lstStyle/>
-          <a:p>
-            <a:r>
-              <a:rPr lang="en-US" dirty="0"/>
-              <a:t>An important concept to understand as a part of Newton’s First Law is the idea of the “Net Force”</a:t>
-            </a:r>
-          </a:p>
-          <a:p>
-            <a:endParaRPr lang="en-US" dirty="0"/>
-          </a:p>
-          <a:p>
-            <a:r>
-              <a:rPr lang="en-US" dirty="0"/>
-              <a:t>The </a:t>
-            </a:r>
-            <a:r>
-              <a:rPr lang="en-US" b="1" dirty="0"/>
-              <a:t>net force</a:t>
-            </a:r>
-            <a:r>
-              <a:rPr lang="en-US" dirty="0"/>
-              <a:t> is the </a:t>
-            </a:r>
-            <a:r>
-              <a:rPr lang="en-US" b="1" dirty="0"/>
-              <a:t>sum</a:t>
-            </a:r>
-            <a:r>
-              <a:rPr lang="en-US" dirty="0"/>
-              <a:t> of all the forces acting on a body.</a:t>
-            </a:r>
-          </a:p>
-          <a:p>
-            <a:r>
-              <a:rPr lang="en-US" dirty="0"/>
-              <a:t>A </a:t>
-            </a:r>
-            <a:r>
-              <a:rPr lang="en-US" b="1" dirty="0"/>
-              <a:t>non-zero net force</a:t>
-            </a:r>
-            <a:r>
-              <a:rPr lang="en-US" dirty="0"/>
-              <a:t>, or unbalanced force is needed to change the velocity of the body. If the velocity is changing it has an </a:t>
-            </a:r>
-            <a:r>
-              <a:rPr lang="en-US" b="1" dirty="0"/>
-              <a:t>acceleration</a:t>
-            </a:r>
-            <a:r>
-              <a:rPr lang="en-US" dirty="0"/>
-              <a:t>.</a:t>
-            </a:r>
-          </a:p>
-        </p:txBody>
-      </p:sp>
-      <p:sp>
-        <p:nvSpPr>
-          <p:cNvPr id="4" name="Slide Number Placeholder 3"/>
-          <p:cNvSpPr>
-            <a:spLocks noGrp="1"/>
-          </p:cNvSpPr>
-          <p:nvPr>
-            <p:ph type="sldNum" sz="quarter" idx="12"/>
-          </p:nvPr>
-        </p:nvSpPr>
-        <p:spPr/>
-        <p:txBody>
-          <a:bodyPr/>
-          <a:lstStyle/>
-          <a:p>
-            <a:fld id="{929262FE-7F58-4A1E-8AF3-5A510A86DEBD}" type="slidenum">
-              <a:rPr lang="en-US" smtClean="0"/>
-              <a:t>5</a:t>
-            </a:fld>
-            <a:endParaRPr lang="en-US"/>
-          </a:p>
-        </p:txBody>
-      </p:sp>
-      <p:pic>
-        <p:nvPicPr>
-          <p:cNvPr id="5" name="Picture 2" descr="A Rock in a Field By Liz Gray [CC-BY-SA-2.0 (http://creativecommons.org/licenses/by-sa/2.0)], via Wikimedia Commons"/>
-          <p:cNvPicPr>
-            <a:picLocks noChangeAspect="1" noChangeArrowheads="1"/>
-          </p:cNvPicPr>
-          <p:nvPr/>
-        </p:nvPicPr>
-        <p:blipFill rotWithShape="1">
-          <a:blip r:embed="rId2">
-            <a:extLst>
-              <a:ext uri="{28A0092B-C50C-407E-A947-70E740481C1C}">
-                <a14:useLocalDpi xmlns:a14="http://schemas.microsoft.com/office/drawing/2010/main" val="0"/>
-              </a:ext>
-            </a:extLst>
-          </a:blip>
-          <a:srcRect l="44506"/>
-          <a:stretch/>
-        </p:blipFill>
-        <p:spPr bwMode="auto">
-          <a:xfrm>
-            <a:off x="5859236" y="2133600"/>
-            <a:ext cx="2808514" cy="3795665"/>
-          </a:xfrm>
-          <a:prstGeom prst="rect">
-            <a:avLst/>
-          </a:prstGeom>
-          <a:noFill/>
-          <a:extLst>
-            <a:ext uri="{909E8E84-426E-40DD-AFC4-6F175D3DCCD1}">
-              <a14:hiddenFill xmlns:a14="http://schemas.microsoft.com/office/drawing/2010/main">
-                <a:solidFill>
-                  <a:srgbClr val="FFFFFF"/>
-                </a:solidFill>
-              </a14:hiddenFill>
-            </a:ext>
-          </a:extLst>
-        </p:spPr>
-      </p:pic>
-    </p:spTree>
-    <p:extLst>
-      <p:ext uri="{BB962C8B-B14F-4D97-AF65-F5344CB8AC3E}">
-        <p14:creationId xmlns:p14="http://schemas.microsoft.com/office/powerpoint/2010/main" val="1790905930"/>
-      </p:ext>
-    </p:extLst>
-  </p:cSld>
-  <p:clrMapOvr>
-    <a:masterClrMapping/>
-  </p:clrMapOvr>
-  <p:timing>
-    <p:tnLst>
-      <p:par>
-        <p:cTn id="1" dur="indefinite" restart="never" nodeType="tmRoot">
-          <p:childTnLst>
-            <p:seq concurrent="1" nextAc="seek">
-              <p:cTn id="2" dur="indefinite" nodeType="mainSeq">
-                <p:childTnLst>
-                  <p:par>
-                    <p:cTn id="3" fill="hold">
-                      <p:stCondLst>
-                        <p:cond delay="indefinite"/>
-                      </p:stCondLst>
-                      <p:childTnLst>
-                        <p:par>
-                          <p:cTn id="4" fill="hold">
-                            <p:stCondLst>
-                              <p:cond delay="0"/>
-                            </p:stCondLst>
-                            <p:childTnLst>
-                              <p:par>
-                                <p:cTn id="5" presetID="10" presetClass="entr" presetSubtype="0" fill="hold" grpId="0" nodeType="clickEffect">
-                                  <p:stCondLst>
-                                    <p:cond delay="0"/>
-                                  </p:stCondLst>
-                                  <p:childTnLst>
-                                    <p:set>
-                                      <p:cBhvr>
-                                        <p:cTn id="6" dur="1" fill="hold">
-                                          <p:stCondLst>
-                                            <p:cond delay="0"/>
-                                          </p:stCondLst>
-                                        </p:cTn>
-                                        <p:tgtEl>
-                                          <p:spTgt spid="3">
-                                            <p:txEl>
-                                              <p:pRg st="0" end="0"/>
-                                            </p:txEl>
-                                          </p:spTgt>
-                                        </p:tgtEl>
-                                        <p:attrNameLst>
-                                          <p:attrName>style.visibility</p:attrName>
-                                        </p:attrNameLst>
-                                      </p:cBhvr>
-                                      <p:to>
-                                        <p:strVal val="visible"/>
-                                      </p:to>
-                                    </p:set>
-                                    <p:animEffect transition="in" filter="fade">
-                                      <p:cBhvr>
-                                        <p:cTn id="7" dur="500"/>
-                                        <p:tgtEl>
-                                          <p:spTgt spid="3">
-                                            <p:txEl>
-                                              <p:pRg st="0" end="0"/>
-                                            </p:txEl>
-                                          </p:spTgt>
-                                        </p:tgtEl>
-                                      </p:cBhvr>
-                                    </p:animEffect>
-                                  </p:childTnLst>
-                                </p:cTn>
-                              </p:par>
-                            </p:childTnLst>
-                          </p:cTn>
-                        </p:par>
-                      </p:childTnLst>
-                    </p:cTn>
-                  </p:par>
-                  <p:par>
-                    <p:cTn id="8" fill="hold">
-                      <p:stCondLst>
-                        <p:cond delay="indefinite"/>
-                      </p:stCondLst>
-                      <p:childTnLst>
-                        <p:par>
-                          <p:cTn id="9" fill="hold">
-                            <p:stCondLst>
-                              <p:cond delay="0"/>
-                            </p:stCondLst>
-                            <p:childTnLst>
-                              <p:par>
-                                <p:cTn id="10" presetID="10" presetClass="entr" presetSubtype="0" fill="hold" grpId="0" nodeType="clickEffect">
-                                  <p:stCondLst>
-                                    <p:cond delay="0"/>
-                                  </p:stCondLst>
-                                  <p:childTnLst>
-                                    <p:set>
-                                      <p:cBhvr>
-                                        <p:cTn id="11" dur="1" fill="hold">
-                                          <p:stCondLst>
-                                            <p:cond delay="0"/>
-                                          </p:stCondLst>
-                                        </p:cTn>
-                                        <p:tgtEl>
-                                          <p:spTgt spid="3">
-                                            <p:txEl>
-                                              <p:pRg st="2" end="2"/>
-                                            </p:txEl>
-                                          </p:spTgt>
-                                        </p:tgtEl>
-                                        <p:attrNameLst>
-                                          <p:attrName>style.visibility</p:attrName>
-                                        </p:attrNameLst>
-                                      </p:cBhvr>
-                                      <p:to>
-                                        <p:strVal val="visible"/>
-                                      </p:to>
-                                    </p:set>
-                                    <p:animEffect transition="in" filter="fade">
-                                      <p:cBhvr>
-                                        <p:cTn id="12" dur="500"/>
-                                        <p:tgtEl>
-                                          <p:spTgt spid="3">
-                                            <p:txEl>
-                                              <p:pRg st="2" end="2"/>
-                                            </p:txEl>
-                                          </p:spTgt>
-                                        </p:tgtEl>
-                                      </p:cBhvr>
-                                    </p:animEffect>
-                                  </p:childTnLst>
-                                </p:cTn>
-                              </p:par>
-                            </p:childTnLst>
-                          </p:cTn>
-                        </p:par>
-                      </p:childTnLst>
-                    </p:cTn>
-                  </p:par>
-                  <p:par>
-                    <p:cTn id="13" fill="hold">
-                      <p:stCondLst>
-                        <p:cond delay="indefinite"/>
-                      </p:stCondLst>
-                      <p:childTnLst>
-                        <p:par>
-                          <p:cTn id="14" fill="hold">
-                            <p:stCondLst>
-                              <p:cond delay="0"/>
-                            </p:stCondLst>
-                            <p:childTnLst>
-                              <p:par>
-                                <p:cTn id="15" presetID="10" presetClass="entr" presetSubtype="0" fill="hold" grpId="0" nodeType="clickEffect">
-                                  <p:stCondLst>
-                                    <p:cond delay="0"/>
-                                  </p:stCondLst>
-                                  <p:childTnLst>
-                                    <p:set>
-                                      <p:cBhvr>
-                                        <p:cTn id="16" dur="1" fill="hold">
-                                          <p:stCondLst>
-                                            <p:cond delay="0"/>
-                                          </p:stCondLst>
-                                        </p:cTn>
-                                        <p:tgtEl>
-                                          <p:spTgt spid="3">
-                                            <p:txEl>
-                                              <p:pRg st="3" end="3"/>
-                                            </p:txEl>
-                                          </p:spTgt>
-                                        </p:tgtEl>
-                                        <p:attrNameLst>
-                                          <p:attrName>style.visibility</p:attrName>
-                                        </p:attrNameLst>
-                                      </p:cBhvr>
-                                      <p:to>
-                                        <p:strVal val="visible"/>
-                                      </p:to>
-                                    </p:set>
-                                    <p:animEffect transition="in" filter="fade">
-                                      <p:cBhvr>
-                                        <p:cTn id="17" dur="500"/>
-                                        <p:tgtEl>
-                                          <p:spTgt spid="3">
-                                            <p:txEl>
-                                              <p:pRg st="3" end="3"/>
-                                            </p:txEl>
-                                          </p:spTgt>
+                                          <p:spTgt spid="1026"/>
                                         </p:tgtEl>
                                       </p:cBhvr>
                                     </p:animEffect>
@@ -5625,7 +4725,7 @@
 </p:sld>
 </file>
 
-<file path=ppt/slides/slide6.xml><?xml version="1.0" encoding="utf-8"?>
+<file path=ppt/slides/slide4.xml><?xml version="1.0" encoding="utf-8"?>
 <p:sld xmlns:a="http://schemas.openxmlformats.org/drawingml/2006/main" xmlns:r="http://schemas.openxmlformats.org/officeDocument/2006/relationships" xmlns:p="http://schemas.openxmlformats.org/presentationml/2006/main">
   <p:cSld>
     <p:spTree>
@@ -5644,13 +4744,7 @@
       </p:grpSpPr>
       <p:sp>
         <p:nvSpPr>
-          <p:cNvPr id="2" name="Title 1">
-            <a:extLst>
-              <a:ext uri="{FF2B5EF4-FFF2-40B4-BE49-F238E27FC236}">
-                <a16:creationId xmlns:a16="http://schemas.microsoft.com/office/drawing/2014/main" id="{0B79660A-5AA3-4CBA-9708-885D2E381EDC}"/>
-              </a:ext>
-            </a:extLst>
-          </p:cNvPr>
+          <p:cNvPr id="2" name="Title 1"/>
           <p:cNvSpPr>
             <a:spLocks noGrp="1"/>
           </p:cNvSpPr>
@@ -5665,20 +4759,14 @@
           <a:p>
             <a:r>
               <a:rPr lang="en-US" dirty="0"/>
-              <a:t>Newton’s First Law and Rotation</a:t>
-            </a:r>
-          </a:p>
-        </p:txBody>
-      </p:sp>
-      <p:sp>
-        <p:nvSpPr>
-          <p:cNvPr id="3" name="Content Placeholder 2">
-            <a:extLst>
-              <a:ext uri="{FF2B5EF4-FFF2-40B4-BE49-F238E27FC236}">
-                <a16:creationId xmlns:a16="http://schemas.microsoft.com/office/drawing/2014/main" id="{7493D6F3-70FE-4808-9D14-9BEB02C1461D}"/>
-              </a:ext>
-            </a:extLst>
-          </p:cNvPr>
+              <a:t>Moments as Vectors</a:t>
+            </a:r>
+          </a:p>
+        </p:txBody>
+      </p:sp>
+      <p:sp>
+        <p:nvSpPr>
+          <p:cNvPr id="3" name="Content Placeholder 2"/>
           <p:cNvSpPr>
             <a:spLocks noGrp="1"/>
           </p:cNvSpPr>
@@ -5689,99 +4777,96 @@
         <p:spPr>
           <a:xfrm>
             <a:off x="457200" y="1600200"/>
-            <a:ext cx="5257800" cy="4525963"/>
+            <a:ext cx="5867400" cy="4876800"/>
           </a:xfrm>
         </p:spPr>
         <p:txBody>
           <a:bodyPr>
-            <a:normAutofit fontScale="92500" lnSpcReduction="10000"/>
+            <a:normAutofit fontScale="70000" lnSpcReduction="20000"/>
           </a:bodyPr>
           <a:lstStyle/>
           <a:p>
             <a:r>
               <a:rPr lang="en-US" dirty="0"/>
-              <a:t>We can also extend Newton’s First Law to rotation…</a:t>
-            </a:r>
-          </a:p>
-          <a:p>
+              <a:t>Just as forces have both a magnitude and a direction, moments have both a </a:t>
+            </a:r>
+            <a:r>
+              <a:rPr lang="en-US" b="1" dirty="0"/>
+              <a:t>magnitude</a:t>
+            </a:r>
             <a:r>
               <a:rPr lang="en-US" dirty="0"/>
-              <a:t>A body at </a:t>
+              <a:t> and a </a:t>
             </a:r>
             <a:r>
               <a:rPr lang="en-US" b="1" dirty="0"/>
-              <a:t>rest</a:t>
+              <a:t>direction</a:t>
             </a:r>
             <a:r>
               <a:rPr lang="en-US" dirty="0"/>
-              <a:t> will remain at rest unless acted on by an unbalanced </a:t>
-            </a:r>
-            <a:r>
-              <a:rPr lang="en-US" b="1" dirty="0"/>
-              <a:t>moment</a:t>
-            </a:r>
+              <a:t>.</a:t>
+            </a:r>
+          </a:p>
+          <a:p>
+            <a:endParaRPr lang="en-US" dirty="0"/>
+          </a:p>
+          <a:p>
             <a:r>
               <a:rPr lang="en-US" dirty="0"/>
-              <a:t>. A body </a:t>
-            </a:r>
-            <a:r>
-              <a:rPr lang="en-US" b="1" dirty="0"/>
-              <a:t>in motion</a:t>
-            </a:r>
+              <a:t>The magnitude of the moment is related to the degree to which the force would cause angular accelerations about a given point or axis.</a:t>
+            </a:r>
+          </a:p>
+          <a:p>
+            <a:pPr lvl="1"/>
             <a:r>
               <a:rPr lang="en-US" dirty="0"/>
-              <a:t> continues in motion with the same </a:t>
-            </a:r>
-            <a:r>
-              <a:rPr lang="en-US" b="1" dirty="0"/>
-              <a:t>angular velocity</a:t>
-            </a:r>
+              <a:t>Measured in units of force x distance (Nm or ft lbs)</a:t>
+            </a:r>
+          </a:p>
+          <a:p>
             <a:r>
               <a:rPr lang="en-US" dirty="0"/>
-              <a:t> and in the same direction unless acted upon by an </a:t>
-            </a:r>
-            <a:r>
-              <a:rPr lang="en-US" b="1" dirty="0"/>
-              <a:t>unbalanced moment</a:t>
-            </a:r>
-          </a:p>
-        </p:txBody>
-      </p:sp>
-      <p:sp>
-        <p:nvSpPr>
-          <p:cNvPr id="4" name="Slide Number Placeholder 3">
+              <a:t>The direction of the moment vector represents the axis the force would cause the body to rotate around.</a:t>
+            </a:r>
+          </a:p>
+          <a:p>
+            <a:pPr lvl="1"/>
+            <a:r>
+              <a:rPr lang="en-US" dirty="0"/>
+              <a:t>With positive and negative moments representing counter-clockwise and clockwise (respectively) potential rotation about that axis </a:t>
+            </a:r>
+          </a:p>
+        </p:txBody>
+      </p:sp>
+      <p:sp>
+        <p:nvSpPr>
+          <p:cNvPr id="4" name="Slide Number Placeholder 3"/>
+          <p:cNvSpPr>
+            <a:spLocks noGrp="1"/>
+          </p:cNvSpPr>
+          <p:nvPr>
+            <p:ph type="sldNum" sz="quarter" idx="12"/>
+          </p:nvPr>
+        </p:nvSpPr>
+        <p:spPr/>
+        <p:txBody>
+          <a:bodyPr/>
+          <a:lstStyle/>
+          <a:p>
+            <a:fld id="{929262FE-7F58-4A1E-8AF3-5A510A86DEBD}" type="slidenum">
+              <a:rPr lang="en-US" smtClean="0"/>
+              <a:t>4</a:t>
+            </a:fld>
+            <a:endParaRPr lang="en-US"/>
+          </a:p>
+        </p:txBody>
+      </p:sp>
+      <p:pic>
+        <p:nvPicPr>
+          <p:cNvPr id="2050" name="Picture 2" descr="The Right Hand Rule">
             <a:extLst>
               <a:ext uri="{FF2B5EF4-FFF2-40B4-BE49-F238E27FC236}">
-                <a16:creationId xmlns:a16="http://schemas.microsoft.com/office/drawing/2014/main" id="{16E139DB-896A-4692-B8DC-C741C6FB48F5}"/>
-              </a:ext>
-            </a:extLst>
-          </p:cNvPr>
-          <p:cNvSpPr>
-            <a:spLocks noGrp="1"/>
-          </p:cNvSpPr>
-          <p:nvPr>
-            <p:ph type="sldNum" sz="quarter" idx="12"/>
-          </p:nvPr>
-        </p:nvSpPr>
-        <p:spPr/>
-        <p:txBody>
-          <a:bodyPr/>
-          <a:lstStyle/>
-          <a:p>
-            <a:fld id="{929262FE-7F58-4A1E-8AF3-5A510A86DEBD}" type="slidenum">
-              <a:rPr lang="en-US" smtClean="0"/>
-              <a:t>6</a:t>
-            </a:fld>
-            <a:endParaRPr lang="en-US"/>
-          </a:p>
-        </p:txBody>
-      </p:sp>
-      <p:pic>
-        <p:nvPicPr>
-          <p:cNvPr id="1026" name="Picture 2" descr="Spinning Top">
-            <a:extLst>
-              <a:ext uri="{FF2B5EF4-FFF2-40B4-BE49-F238E27FC236}">
-                <a16:creationId xmlns:a16="http://schemas.microsoft.com/office/drawing/2014/main" id="{5C8C8E4C-C20F-4D3A-ACE6-42AB8B89E56A}"/>
+                <a16:creationId xmlns:a16="http://schemas.microsoft.com/office/drawing/2014/main" id="{2B4F3925-8942-46AC-853C-A4FB8EE3A98C}"/>
               </a:ext>
             </a:extLst>
           </p:cNvPr>
@@ -5805,8 +4890,8 @@
         </p:blipFill>
         <p:spPr bwMode="auto">
           <a:xfrm>
-            <a:off x="6096000" y="2707843"/>
-            <a:ext cx="2743200" cy="2051914"/>
+            <a:off x="6210300" y="2438400"/>
+            <a:ext cx="2857500" cy="2371725"/>
           </a:xfrm>
           <a:prstGeom prst="rect">
             <a:avLst/>
@@ -5826,7 +4911,1349 @@
     </p:spTree>
     <p:extLst>
       <p:ext uri="{BB962C8B-B14F-4D97-AF65-F5344CB8AC3E}">
-        <p14:creationId xmlns:p14="http://schemas.microsoft.com/office/powerpoint/2010/main" val="1673826892"/>
+        <p14:creationId xmlns:p14="http://schemas.microsoft.com/office/powerpoint/2010/main" val="1496043169"/>
+      </p:ext>
+    </p:extLst>
+  </p:cSld>
+  <p:clrMapOvr>
+    <a:masterClrMapping/>
+  </p:clrMapOvr>
+  <p:timing>
+    <p:tnLst>
+      <p:par>
+        <p:cTn id="1" dur="indefinite" restart="never" nodeType="tmRoot">
+          <p:childTnLst>
+            <p:seq concurrent="1" nextAc="seek">
+              <p:cTn id="2" dur="indefinite" nodeType="mainSeq">
+                <p:childTnLst>
+                  <p:par>
+                    <p:cTn id="3" fill="hold">
+                      <p:stCondLst>
+                        <p:cond delay="indefinite"/>
+                      </p:stCondLst>
+                      <p:childTnLst>
+                        <p:par>
+                          <p:cTn id="4" fill="hold">
+                            <p:stCondLst>
+                              <p:cond delay="0"/>
+                            </p:stCondLst>
+                            <p:childTnLst>
+                              <p:par>
+                                <p:cTn id="5" presetID="1" presetClass="entr" presetSubtype="0" fill="hold" grpId="0" nodeType="clickEffect">
+                                  <p:stCondLst>
+                                    <p:cond delay="0"/>
+                                  </p:stCondLst>
+                                  <p:childTnLst>
+                                    <p:set>
+                                      <p:cBhvr>
+                                        <p:cTn id="6" dur="1" fill="hold">
+                                          <p:stCondLst>
+                                            <p:cond delay="0"/>
+                                          </p:stCondLst>
+                                        </p:cTn>
+                                        <p:tgtEl>
+                                          <p:spTgt spid="3">
+                                            <p:txEl>
+                                              <p:pRg st="0" end="0"/>
+                                            </p:txEl>
+                                          </p:spTgt>
+                                        </p:tgtEl>
+                                        <p:attrNameLst>
+                                          <p:attrName>style.visibility</p:attrName>
+                                        </p:attrNameLst>
+                                      </p:cBhvr>
+                                      <p:to>
+                                        <p:strVal val="visible"/>
+                                      </p:to>
+                                    </p:set>
+                                  </p:childTnLst>
+                                </p:cTn>
+                              </p:par>
+                            </p:childTnLst>
+                          </p:cTn>
+                        </p:par>
+                      </p:childTnLst>
+                    </p:cTn>
+                  </p:par>
+                  <p:par>
+                    <p:cTn id="7" fill="hold">
+                      <p:stCondLst>
+                        <p:cond delay="indefinite"/>
+                      </p:stCondLst>
+                      <p:childTnLst>
+                        <p:par>
+                          <p:cTn id="8" fill="hold">
+                            <p:stCondLst>
+                              <p:cond delay="0"/>
+                            </p:stCondLst>
+                            <p:childTnLst>
+                              <p:par>
+                                <p:cTn id="9" presetID="1" presetClass="entr" presetSubtype="0" fill="hold" grpId="0" nodeType="clickEffect">
+                                  <p:stCondLst>
+                                    <p:cond delay="0"/>
+                                  </p:stCondLst>
+                                  <p:childTnLst>
+                                    <p:set>
+                                      <p:cBhvr>
+                                        <p:cTn id="10" dur="1" fill="hold">
+                                          <p:stCondLst>
+                                            <p:cond delay="0"/>
+                                          </p:stCondLst>
+                                        </p:cTn>
+                                        <p:tgtEl>
+                                          <p:spTgt spid="3">
+                                            <p:txEl>
+                                              <p:pRg st="2" end="2"/>
+                                            </p:txEl>
+                                          </p:spTgt>
+                                        </p:tgtEl>
+                                        <p:attrNameLst>
+                                          <p:attrName>style.visibility</p:attrName>
+                                        </p:attrNameLst>
+                                      </p:cBhvr>
+                                      <p:to>
+                                        <p:strVal val="visible"/>
+                                      </p:to>
+                                    </p:set>
+                                  </p:childTnLst>
+                                </p:cTn>
+                              </p:par>
+                            </p:childTnLst>
+                          </p:cTn>
+                        </p:par>
+                      </p:childTnLst>
+                    </p:cTn>
+                  </p:par>
+                  <p:par>
+                    <p:cTn id="11" fill="hold">
+                      <p:stCondLst>
+                        <p:cond delay="indefinite"/>
+                      </p:stCondLst>
+                      <p:childTnLst>
+                        <p:par>
+                          <p:cTn id="12" fill="hold">
+                            <p:stCondLst>
+                              <p:cond delay="0"/>
+                            </p:stCondLst>
+                            <p:childTnLst>
+                              <p:par>
+                                <p:cTn id="13" presetID="1" presetClass="entr" presetSubtype="0" fill="hold" grpId="0" nodeType="clickEffect">
+                                  <p:stCondLst>
+                                    <p:cond delay="0"/>
+                                  </p:stCondLst>
+                                  <p:childTnLst>
+                                    <p:set>
+                                      <p:cBhvr>
+                                        <p:cTn id="14" dur="1" fill="hold">
+                                          <p:stCondLst>
+                                            <p:cond delay="0"/>
+                                          </p:stCondLst>
+                                        </p:cTn>
+                                        <p:tgtEl>
+                                          <p:spTgt spid="3">
+                                            <p:txEl>
+                                              <p:pRg st="3" end="3"/>
+                                            </p:txEl>
+                                          </p:spTgt>
+                                        </p:tgtEl>
+                                        <p:attrNameLst>
+                                          <p:attrName>style.visibility</p:attrName>
+                                        </p:attrNameLst>
+                                      </p:cBhvr>
+                                      <p:to>
+                                        <p:strVal val="visible"/>
+                                      </p:to>
+                                    </p:set>
+                                  </p:childTnLst>
+                                </p:cTn>
+                              </p:par>
+                            </p:childTnLst>
+                          </p:cTn>
+                        </p:par>
+                      </p:childTnLst>
+                    </p:cTn>
+                  </p:par>
+                  <p:par>
+                    <p:cTn id="15" fill="hold">
+                      <p:stCondLst>
+                        <p:cond delay="indefinite"/>
+                      </p:stCondLst>
+                      <p:childTnLst>
+                        <p:par>
+                          <p:cTn id="16" fill="hold">
+                            <p:stCondLst>
+                              <p:cond delay="0"/>
+                            </p:stCondLst>
+                            <p:childTnLst>
+                              <p:par>
+                                <p:cTn id="17" presetID="1" presetClass="entr" presetSubtype="0" fill="hold" grpId="0" nodeType="clickEffect">
+                                  <p:stCondLst>
+                                    <p:cond delay="0"/>
+                                  </p:stCondLst>
+                                  <p:childTnLst>
+                                    <p:set>
+                                      <p:cBhvr>
+                                        <p:cTn id="18" dur="1" fill="hold">
+                                          <p:stCondLst>
+                                            <p:cond delay="0"/>
+                                          </p:stCondLst>
+                                        </p:cTn>
+                                        <p:tgtEl>
+                                          <p:spTgt spid="3">
+                                            <p:txEl>
+                                              <p:pRg st="4" end="4"/>
+                                            </p:txEl>
+                                          </p:spTgt>
+                                        </p:tgtEl>
+                                        <p:attrNameLst>
+                                          <p:attrName>style.visibility</p:attrName>
+                                        </p:attrNameLst>
+                                      </p:cBhvr>
+                                      <p:to>
+                                        <p:strVal val="visible"/>
+                                      </p:to>
+                                    </p:set>
+                                  </p:childTnLst>
+                                </p:cTn>
+                              </p:par>
+                            </p:childTnLst>
+                          </p:cTn>
+                        </p:par>
+                      </p:childTnLst>
+                    </p:cTn>
+                  </p:par>
+                  <p:par>
+                    <p:cTn id="19" fill="hold">
+                      <p:stCondLst>
+                        <p:cond delay="indefinite"/>
+                      </p:stCondLst>
+                      <p:childTnLst>
+                        <p:par>
+                          <p:cTn id="20" fill="hold">
+                            <p:stCondLst>
+                              <p:cond delay="0"/>
+                            </p:stCondLst>
+                            <p:childTnLst>
+                              <p:par>
+                                <p:cTn id="21" presetID="1" presetClass="entr" presetSubtype="0" fill="hold" grpId="0" nodeType="clickEffect">
+                                  <p:stCondLst>
+                                    <p:cond delay="0"/>
+                                  </p:stCondLst>
+                                  <p:childTnLst>
+                                    <p:set>
+                                      <p:cBhvr>
+                                        <p:cTn id="22" dur="1" fill="hold">
+                                          <p:stCondLst>
+                                            <p:cond delay="0"/>
+                                          </p:stCondLst>
+                                        </p:cTn>
+                                        <p:tgtEl>
+                                          <p:spTgt spid="3">
+                                            <p:txEl>
+                                              <p:pRg st="5" end="5"/>
+                                            </p:txEl>
+                                          </p:spTgt>
+                                        </p:tgtEl>
+                                        <p:attrNameLst>
+                                          <p:attrName>style.visibility</p:attrName>
+                                        </p:attrNameLst>
+                                      </p:cBhvr>
+                                      <p:to>
+                                        <p:strVal val="visible"/>
+                                      </p:to>
+                                    </p:set>
+                                  </p:childTnLst>
+                                </p:cTn>
+                              </p:par>
+                            </p:childTnLst>
+                          </p:cTn>
+                        </p:par>
+                      </p:childTnLst>
+                    </p:cTn>
+                  </p:par>
+                  <p:par>
+                    <p:cTn id="23" fill="hold">
+                      <p:stCondLst>
+                        <p:cond delay="indefinite"/>
+                      </p:stCondLst>
+                      <p:childTnLst>
+                        <p:par>
+                          <p:cTn id="24" fill="hold">
+                            <p:stCondLst>
+                              <p:cond delay="0"/>
+                            </p:stCondLst>
+                            <p:childTnLst>
+                              <p:par>
+                                <p:cTn id="25" presetID="10" presetClass="entr" presetSubtype="0" fill="hold" nodeType="clickEffect">
+                                  <p:stCondLst>
+                                    <p:cond delay="0"/>
+                                  </p:stCondLst>
+                                  <p:childTnLst>
+                                    <p:set>
+                                      <p:cBhvr>
+                                        <p:cTn id="26" dur="1" fill="hold">
+                                          <p:stCondLst>
+                                            <p:cond delay="0"/>
+                                          </p:stCondLst>
+                                        </p:cTn>
+                                        <p:tgtEl>
+                                          <p:spTgt spid="2050"/>
+                                        </p:tgtEl>
+                                        <p:attrNameLst>
+                                          <p:attrName>style.visibility</p:attrName>
+                                        </p:attrNameLst>
+                                      </p:cBhvr>
+                                      <p:to>
+                                        <p:strVal val="visible"/>
+                                      </p:to>
+                                    </p:set>
+                                    <p:animEffect transition="in" filter="fade">
+                                      <p:cBhvr>
+                                        <p:cTn id="27" dur="500"/>
+                                        <p:tgtEl>
+                                          <p:spTgt spid="2050"/>
+                                        </p:tgtEl>
+                                      </p:cBhvr>
+                                    </p:animEffect>
+                                  </p:childTnLst>
+                                </p:cTn>
+                              </p:par>
+                            </p:childTnLst>
+                          </p:cTn>
+                        </p:par>
+                      </p:childTnLst>
+                    </p:cTn>
+                  </p:par>
+                </p:childTnLst>
+              </p:cTn>
+              <p:prevCondLst>
+                <p:cond evt="onPrev" delay="0">
+                  <p:tgtEl>
+                    <p:sldTgt/>
+                  </p:tgtEl>
+                </p:cond>
+              </p:prevCondLst>
+              <p:nextCondLst>
+                <p:cond evt="onNext" delay="0">
+                  <p:tgtEl>
+                    <p:sldTgt/>
+                  </p:tgtEl>
+                </p:cond>
+              </p:nextCondLst>
+            </p:seq>
+          </p:childTnLst>
+        </p:cTn>
+      </p:par>
+    </p:tnLst>
+    <p:bldLst>
+      <p:bldP spid="3" grpId="0" build="p"/>
+    </p:bldLst>
+  </p:timing>
+</p:sld>
+</file>
+
+<file path=ppt/slides/slide5.xml><?xml version="1.0" encoding="utf-8"?>
+<p:sld xmlns:a="http://schemas.openxmlformats.org/drawingml/2006/main" xmlns:r="http://schemas.openxmlformats.org/officeDocument/2006/relationships" xmlns:p="http://schemas.openxmlformats.org/presentationml/2006/main">
+  <p:cSld>
+    <p:spTree>
+      <p:nvGrpSpPr>
+        <p:cNvPr id="1" name=""/>
+        <p:cNvGrpSpPr/>
+        <p:nvPr/>
+      </p:nvGrpSpPr>
+      <p:grpSpPr>
+        <a:xfrm>
+          <a:off x="0" y="0"/>
+          <a:ext cx="0" cy="0"/>
+          <a:chOff x="0" y="0"/>
+          <a:chExt cx="0" cy="0"/>
+        </a:xfrm>
+      </p:grpSpPr>
+      <p:sp>
+        <p:nvSpPr>
+          <p:cNvPr id="2" name="Title 1"/>
+          <p:cNvSpPr>
+            <a:spLocks noGrp="1"/>
+          </p:cNvSpPr>
+          <p:nvPr>
+            <p:ph type="title"/>
+          </p:nvPr>
+        </p:nvSpPr>
+        <p:spPr/>
+        <p:txBody>
+          <a:bodyPr/>
+          <a:lstStyle/>
+          <a:p>
+            <a:r>
+              <a:rPr lang="en-US" dirty="0"/>
+              <a:t>Taking the Moment About a Point</a:t>
+            </a:r>
+          </a:p>
+        </p:txBody>
+      </p:sp>
+      <p:sp>
+        <p:nvSpPr>
+          <p:cNvPr id="3" name="Content Placeholder 2"/>
+          <p:cNvSpPr>
+            <a:spLocks noGrp="1"/>
+          </p:cNvSpPr>
+          <p:nvPr>
+            <p:ph idx="1"/>
+          </p:nvPr>
+        </p:nvSpPr>
+        <p:spPr>
+          <a:xfrm>
+            <a:off x="457200" y="1600199"/>
+            <a:ext cx="8229600" cy="2840389"/>
+          </a:xfrm>
+        </p:spPr>
+        <p:txBody>
+          <a:bodyPr>
+            <a:normAutofit fontScale="85000" lnSpcReduction="20000"/>
+          </a:bodyPr>
+          <a:lstStyle/>
+          <a:p>
+            <a:r>
+              <a:rPr lang="en-US" dirty="0"/>
+              <a:t>When calculating moments, we need to choose a </a:t>
+            </a:r>
+            <a:r>
+              <a:rPr lang="en-US" b="1" dirty="0"/>
+              <a:t>point we are taking the moment about</a:t>
+            </a:r>
+            <a:r>
+              <a:rPr lang="en-US" dirty="0"/>
+              <a:t>. Both the magnitude and direction of a force will depend upon the point we pick.</a:t>
+            </a:r>
+          </a:p>
+          <a:p>
+            <a:r>
+              <a:rPr lang="en-US" dirty="0"/>
+              <a:t>Direction for a moment in two dimensions is always just going to be </a:t>
+            </a:r>
+            <a:r>
+              <a:rPr lang="en-US" b="1" dirty="0"/>
+              <a:t>counterclockwise</a:t>
+            </a:r>
+            <a:r>
+              <a:rPr lang="en-US" dirty="0"/>
+              <a:t> (</a:t>
+            </a:r>
+            <a:r>
+              <a:rPr lang="en-US" b="1" dirty="0"/>
+              <a:t>positive</a:t>
+            </a:r>
+            <a:r>
+              <a:rPr lang="en-US" dirty="0"/>
+              <a:t>) or </a:t>
+            </a:r>
+            <a:r>
+              <a:rPr lang="en-US" b="1" dirty="0"/>
+              <a:t>clockwise</a:t>
+            </a:r>
+            <a:r>
+              <a:rPr lang="en-US" dirty="0"/>
+              <a:t> (</a:t>
+            </a:r>
+            <a:r>
+              <a:rPr lang="en-US" b="1" dirty="0"/>
+              <a:t>negative</a:t>
+            </a:r>
+            <a:r>
+              <a:rPr lang="en-US" dirty="0"/>
+              <a:t>) and we can add or subtract them as scalar values.</a:t>
+            </a:r>
+          </a:p>
+        </p:txBody>
+      </p:sp>
+      <p:sp>
+        <p:nvSpPr>
+          <p:cNvPr id="4" name="Slide Number Placeholder 3"/>
+          <p:cNvSpPr>
+            <a:spLocks noGrp="1"/>
+          </p:cNvSpPr>
+          <p:nvPr>
+            <p:ph type="sldNum" sz="quarter" idx="12"/>
+          </p:nvPr>
+        </p:nvSpPr>
+        <p:spPr/>
+        <p:txBody>
+          <a:bodyPr/>
+          <a:lstStyle/>
+          <a:p>
+            <a:fld id="{929262FE-7F58-4A1E-8AF3-5A510A86DEBD}" type="slidenum">
+              <a:rPr lang="en-US" smtClean="0"/>
+              <a:t>5</a:t>
+            </a:fld>
+            <a:endParaRPr lang="en-US"/>
+          </a:p>
+        </p:txBody>
+      </p:sp>
+      <p:sp>
+        <p:nvSpPr>
+          <p:cNvPr id="5" name="Rectangle 4"/>
+          <p:cNvSpPr/>
+          <p:nvPr/>
+        </p:nvSpPr>
+        <p:spPr>
+          <a:xfrm>
+            <a:off x="2133600" y="5007429"/>
+            <a:ext cx="4876800" cy="370114"/>
+          </a:xfrm>
+          <a:prstGeom prst="rect">
+            <a:avLst/>
+          </a:prstGeom>
+          <a:solidFill>
+            <a:schemeClr val="bg2">
+              <a:lumMod val="75000"/>
+            </a:schemeClr>
+          </a:solidFill>
+          <a:ln>
+            <a:solidFill>
+              <a:schemeClr val="bg2">
+                <a:lumMod val="50000"/>
+              </a:schemeClr>
+            </a:solidFill>
+          </a:ln>
+        </p:spPr>
+        <p:style>
+          <a:lnRef idx="2">
+            <a:schemeClr val="accent6">
+              <a:shade val="50000"/>
+            </a:schemeClr>
+          </a:lnRef>
+          <a:fillRef idx="1">
+            <a:schemeClr val="accent6"/>
+          </a:fillRef>
+          <a:effectRef idx="0">
+            <a:schemeClr val="accent6"/>
+          </a:effectRef>
+          <a:fontRef idx="minor">
+            <a:schemeClr val="lt1"/>
+          </a:fontRef>
+        </p:style>
+        <p:txBody>
+          <a:bodyPr rtlCol="0" anchor="ctr"/>
+          <a:lstStyle/>
+          <a:p>
+            <a:pPr algn="ctr"/>
+            <a:endParaRPr lang="en-US"/>
+          </a:p>
+        </p:txBody>
+      </p:sp>
+      <p:cxnSp>
+        <p:nvCxnSpPr>
+          <p:cNvPr id="7" name="Straight Arrow Connector 6"/>
+          <p:cNvCxnSpPr/>
+          <p:nvPr/>
+        </p:nvCxnSpPr>
+        <p:spPr>
+          <a:xfrm flipV="1">
+            <a:off x="4572000" y="5399314"/>
+            <a:ext cx="0" cy="914400"/>
+          </a:xfrm>
+          <a:prstGeom prst="straightConnector1">
+            <a:avLst/>
+          </a:prstGeom>
+          <a:ln>
+            <a:solidFill>
+              <a:srgbClr val="FF0000"/>
+            </a:solidFill>
+            <a:tailEnd type="arrow"/>
+          </a:ln>
+        </p:spPr>
+        <p:style>
+          <a:lnRef idx="3">
+            <a:schemeClr val="accent2"/>
+          </a:lnRef>
+          <a:fillRef idx="0">
+            <a:schemeClr val="accent2"/>
+          </a:fillRef>
+          <a:effectRef idx="2">
+            <a:schemeClr val="accent2"/>
+          </a:effectRef>
+          <a:fontRef idx="minor">
+            <a:schemeClr val="tx1"/>
+          </a:fontRef>
+        </p:style>
+      </p:cxnSp>
+      <p:sp>
+        <p:nvSpPr>
+          <p:cNvPr id="8" name="TextBox 7"/>
+          <p:cNvSpPr txBox="1"/>
+          <p:nvPr/>
+        </p:nvSpPr>
+        <p:spPr>
+          <a:xfrm>
+            <a:off x="2120684" y="4583668"/>
+            <a:ext cx="317716" cy="369332"/>
+          </a:xfrm>
+          <a:prstGeom prst="rect">
+            <a:avLst/>
+          </a:prstGeom>
+          <a:noFill/>
+        </p:spPr>
+        <p:txBody>
+          <a:bodyPr wrap="none" rtlCol="0">
+            <a:spAutoFit/>
+          </a:bodyPr>
+          <a:lstStyle/>
+          <a:p>
+            <a:r>
+              <a:rPr lang="en-US" dirty="0"/>
+              <a:t>A</a:t>
+            </a:r>
+          </a:p>
+        </p:txBody>
+      </p:sp>
+      <p:sp>
+        <p:nvSpPr>
+          <p:cNvPr id="9" name="Oval 8"/>
+          <p:cNvSpPr/>
+          <p:nvPr/>
+        </p:nvSpPr>
+        <p:spPr>
+          <a:xfrm>
+            <a:off x="2216332" y="5144588"/>
+            <a:ext cx="91440" cy="91440"/>
+          </a:xfrm>
+          <a:prstGeom prst="ellipse">
+            <a:avLst/>
+          </a:prstGeom>
+        </p:spPr>
+        <p:style>
+          <a:lnRef idx="2">
+            <a:schemeClr val="dk1">
+              <a:shade val="50000"/>
+            </a:schemeClr>
+          </a:lnRef>
+          <a:fillRef idx="1">
+            <a:schemeClr val="dk1"/>
+          </a:fillRef>
+          <a:effectRef idx="0">
+            <a:schemeClr val="dk1"/>
+          </a:effectRef>
+          <a:fontRef idx="minor">
+            <a:schemeClr val="lt1"/>
+          </a:fontRef>
+        </p:style>
+        <p:txBody>
+          <a:bodyPr rtlCol="0" anchor="ctr"/>
+          <a:lstStyle/>
+          <a:p>
+            <a:pPr algn="ctr"/>
+            <a:endParaRPr lang="en-US"/>
+          </a:p>
+        </p:txBody>
+      </p:sp>
+      <p:sp>
+        <p:nvSpPr>
+          <p:cNvPr id="10" name="TextBox 9"/>
+          <p:cNvSpPr txBox="1"/>
+          <p:nvPr/>
+        </p:nvSpPr>
+        <p:spPr>
+          <a:xfrm>
+            <a:off x="3644684" y="4582886"/>
+            <a:ext cx="308098" cy="369332"/>
+          </a:xfrm>
+          <a:prstGeom prst="rect">
+            <a:avLst/>
+          </a:prstGeom>
+          <a:noFill/>
+        </p:spPr>
+        <p:txBody>
+          <a:bodyPr wrap="none" rtlCol="0">
+            <a:spAutoFit/>
+          </a:bodyPr>
+          <a:lstStyle/>
+          <a:p>
+            <a:r>
+              <a:rPr lang="en-US" dirty="0"/>
+              <a:t>C</a:t>
+            </a:r>
+          </a:p>
+        </p:txBody>
+      </p:sp>
+      <p:sp>
+        <p:nvSpPr>
+          <p:cNvPr id="11" name="Oval 10"/>
+          <p:cNvSpPr/>
+          <p:nvPr/>
+        </p:nvSpPr>
+        <p:spPr>
+          <a:xfrm>
+            <a:off x="3740332" y="5143806"/>
+            <a:ext cx="91440" cy="91440"/>
+          </a:xfrm>
+          <a:prstGeom prst="ellipse">
+            <a:avLst/>
+          </a:prstGeom>
+        </p:spPr>
+        <p:style>
+          <a:lnRef idx="2">
+            <a:schemeClr val="dk1">
+              <a:shade val="50000"/>
+            </a:schemeClr>
+          </a:lnRef>
+          <a:fillRef idx="1">
+            <a:schemeClr val="dk1"/>
+          </a:fillRef>
+          <a:effectRef idx="0">
+            <a:schemeClr val="dk1"/>
+          </a:effectRef>
+          <a:fontRef idx="minor">
+            <a:schemeClr val="lt1"/>
+          </a:fontRef>
+        </p:style>
+        <p:txBody>
+          <a:bodyPr rtlCol="0" anchor="ctr"/>
+          <a:lstStyle/>
+          <a:p>
+            <a:pPr algn="ctr"/>
+            <a:endParaRPr lang="en-US"/>
+          </a:p>
+        </p:txBody>
+      </p:sp>
+      <p:sp>
+        <p:nvSpPr>
+          <p:cNvPr id="12" name="TextBox 11"/>
+          <p:cNvSpPr txBox="1"/>
+          <p:nvPr/>
+        </p:nvSpPr>
+        <p:spPr>
+          <a:xfrm>
+            <a:off x="6683830" y="4593772"/>
+            <a:ext cx="309700" cy="369332"/>
+          </a:xfrm>
+          <a:prstGeom prst="rect">
+            <a:avLst/>
+          </a:prstGeom>
+          <a:noFill/>
+        </p:spPr>
+        <p:txBody>
+          <a:bodyPr wrap="none" rtlCol="0">
+            <a:spAutoFit/>
+          </a:bodyPr>
+          <a:lstStyle/>
+          <a:p>
+            <a:r>
+              <a:rPr lang="en-US" dirty="0"/>
+              <a:t>B</a:t>
+            </a:r>
+          </a:p>
+        </p:txBody>
+      </p:sp>
+      <p:sp>
+        <p:nvSpPr>
+          <p:cNvPr id="13" name="Oval 12"/>
+          <p:cNvSpPr/>
+          <p:nvPr/>
+        </p:nvSpPr>
+        <p:spPr>
+          <a:xfrm>
+            <a:off x="6779478" y="5154692"/>
+            <a:ext cx="91440" cy="91440"/>
+          </a:xfrm>
+          <a:prstGeom prst="ellipse">
+            <a:avLst/>
+          </a:prstGeom>
+        </p:spPr>
+        <p:style>
+          <a:lnRef idx="2">
+            <a:schemeClr val="dk1">
+              <a:shade val="50000"/>
+            </a:schemeClr>
+          </a:lnRef>
+          <a:fillRef idx="1">
+            <a:schemeClr val="dk1"/>
+          </a:fillRef>
+          <a:effectRef idx="0">
+            <a:schemeClr val="dk1"/>
+          </a:effectRef>
+          <a:fontRef idx="minor">
+            <a:schemeClr val="lt1"/>
+          </a:fontRef>
+        </p:style>
+        <p:txBody>
+          <a:bodyPr rtlCol="0" anchor="ctr"/>
+          <a:lstStyle/>
+          <a:p>
+            <a:pPr algn="ctr"/>
+            <a:endParaRPr lang="en-US"/>
+          </a:p>
+        </p:txBody>
+      </p:sp>
+    </p:spTree>
+    <p:extLst>
+      <p:ext uri="{BB962C8B-B14F-4D97-AF65-F5344CB8AC3E}">
+        <p14:creationId xmlns:p14="http://schemas.microsoft.com/office/powerpoint/2010/main" val="3724594762"/>
+      </p:ext>
+    </p:extLst>
+  </p:cSld>
+  <p:clrMapOvr>
+    <a:masterClrMapping/>
+  </p:clrMapOvr>
+  <p:timing>
+    <p:tnLst>
+      <p:par>
+        <p:cTn id="1" dur="indefinite" restart="never" nodeType="tmRoot">
+          <p:childTnLst>
+            <p:seq concurrent="1" nextAc="seek">
+              <p:cTn id="2" dur="indefinite" nodeType="mainSeq">
+                <p:childTnLst>
+                  <p:par>
+                    <p:cTn id="3" fill="hold">
+                      <p:stCondLst>
+                        <p:cond delay="indefinite"/>
+                      </p:stCondLst>
+                      <p:childTnLst>
+                        <p:par>
+                          <p:cTn id="4" fill="hold">
+                            <p:stCondLst>
+                              <p:cond delay="0"/>
+                            </p:stCondLst>
+                            <p:childTnLst>
+                              <p:par>
+                                <p:cTn id="5" presetID="1" presetClass="entr" presetSubtype="0" fill="hold" grpId="0" nodeType="clickEffect">
+                                  <p:stCondLst>
+                                    <p:cond delay="0"/>
+                                  </p:stCondLst>
+                                  <p:childTnLst>
+                                    <p:set>
+                                      <p:cBhvr>
+                                        <p:cTn id="6" dur="1" fill="hold">
+                                          <p:stCondLst>
+                                            <p:cond delay="0"/>
+                                          </p:stCondLst>
+                                        </p:cTn>
+                                        <p:tgtEl>
+                                          <p:spTgt spid="3">
+                                            <p:txEl>
+                                              <p:pRg st="0" end="0"/>
+                                            </p:txEl>
+                                          </p:spTgt>
+                                        </p:tgtEl>
+                                        <p:attrNameLst>
+                                          <p:attrName>style.visibility</p:attrName>
+                                        </p:attrNameLst>
+                                      </p:cBhvr>
+                                      <p:to>
+                                        <p:strVal val="visible"/>
+                                      </p:to>
+                                    </p:set>
+                                  </p:childTnLst>
+                                </p:cTn>
+                              </p:par>
+                            </p:childTnLst>
+                          </p:cTn>
+                        </p:par>
+                      </p:childTnLst>
+                    </p:cTn>
+                  </p:par>
+                  <p:par>
+                    <p:cTn id="7" fill="hold">
+                      <p:stCondLst>
+                        <p:cond delay="indefinite"/>
+                      </p:stCondLst>
+                      <p:childTnLst>
+                        <p:par>
+                          <p:cTn id="8" fill="hold">
+                            <p:stCondLst>
+                              <p:cond delay="0"/>
+                            </p:stCondLst>
+                            <p:childTnLst>
+                              <p:par>
+                                <p:cTn id="9" presetID="10" presetClass="entr" presetSubtype="0" fill="hold" grpId="0" nodeType="clickEffect">
+                                  <p:stCondLst>
+                                    <p:cond delay="0"/>
+                                  </p:stCondLst>
+                                  <p:childTnLst>
+                                    <p:set>
+                                      <p:cBhvr>
+                                        <p:cTn id="10" dur="1" fill="hold">
+                                          <p:stCondLst>
+                                            <p:cond delay="0"/>
+                                          </p:stCondLst>
+                                        </p:cTn>
+                                        <p:tgtEl>
+                                          <p:spTgt spid="9"/>
+                                        </p:tgtEl>
+                                        <p:attrNameLst>
+                                          <p:attrName>style.visibility</p:attrName>
+                                        </p:attrNameLst>
+                                      </p:cBhvr>
+                                      <p:to>
+                                        <p:strVal val="visible"/>
+                                      </p:to>
+                                    </p:set>
+                                    <p:animEffect transition="in" filter="fade">
+                                      <p:cBhvr>
+                                        <p:cTn id="11" dur="500"/>
+                                        <p:tgtEl>
+                                          <p:spTgt spid="9"/>
+                                        </p:tgtEl>
+                                      </p:cBhvr>
+                                    </p:animEffect>
+                                  </p:childTnLst>
+                                </p:cTn>
+                              </p:par>
+                              <p:par>
+                                <p:cTn id="12" presetID="10" presetClass="entr" presetSubtype="0" fill="hold" grpId="0" nodeType="withEffect">
+                                  <p:stCondLst>
+                                    <p:cond delay="0"/>
+                                  </p:stCondLst>
+                                  <p:childTnLst>
+                                    <p:set>
+                                      <p:cBhvr>
+                                        <p:cTn id="13" dur="1" fill="hold">
+                                          <p:stCondLst>
+                                            <p:cond delay="0"/>
+                                          </p:stCondLst>
+                                        </p:cTn>
+                                        <p:tgtEl>
+                                          <p:spTgt spid="8"/>
+                                        </p:tgtEl>
+                                        <p:attrNameLst>
+                                          <p:attrName>style.visibility</p:attrName>
+                                        </p:attrNameLst>
+                                      </p:cBhvr>
+                                      <p:to>
+                                        <p:strVal val="visible"/>
+                                      </p:to>
+                                    </p:set>
+                                    <p:animEffect transition="in" filter="fade">
+                                      <p:cBhvr>
+                                        <p:cTn id="14" dur="500"/>
+                                        <p:tgtEl>
+                                          <p:spTgt spid="8"/>
+                                        </p:tgtEl>
+                                      </p:cBhvr>
+                                    </p:animEffect>
+                                  </p:childTnLst>
+                                </p:cTn>
+                              </p:par>
+                            </p:childTnLst>
+                          </p:cTn>
+                        </p:par>
+                      </p:childTnLst>
+                    </p:cTn>
+                  </p:par>
+                  <p:par>
+                    <p:cTn id="15" fill="hold">
+                      <p:stCondLst>
+                        <p:cond delay="indefinite"/>
+                      </p:stCondLst>
+                      <p:childTnLst>
+                        <p:par>
+                          <p:cTn id="16" fill="hold">
+                            <p:stCondLst>
+                              <p:cond delay="0"/>
+                            </p:stCondLst>
+                            <p:childTnLst>
+                              <p:par>
+                                <p:cTn id="17" presetID="10" presetClass="entr" presetSubtype="0" fill="hold" grpId="0" nodeType="clickEffect">
+                                  <p:stCondLst>
+                                    <p:cond delay="0"/>
+                                  </p:stCondLst>
+                                  <p:childTnLst>
+                                    <p:set>
+                                      <p:cBhvr>
+                                        <p:cTn id="18" dur="1" fill="hold">
+                                          <p:stCondLst>
+                                            <p:cond delay="0"/>
+                                          </p:stCondLst>
+                                        </p:cTn>
+                                        <p:tgtEl>
+                                          <p:spTgt spid="13"/>
+                                        </p:tgtEl>
+                                        <p:attrNameLst>
+                                          <p:attrName>style.visibility</p:attrName>
+                                        </p:attrNameLst>
+                                      </p:cBhvr>
+                                      <p:to>
+                                        <p:strVal val="visible"/>
+                                      </p:to>
+                                    </p:set>
+                                    <p:animEffect transition="in" filter="fade">
+                                      <p:cBhvr>
+                                        <p:cTn id="19" dur="500"/>
+                                        <p:tgtEl>
+                                          <p:spTgt spid="13"/>
+                                        </p:tgtEl>
+                                      </p:cBhvr>
+                                    </p:animEffect>
+                                  </p:childTnLst>
+                                </p:cTn>
+                              </p:par>
+                              <p:par>
+                                <p:cTn id="20" presetID="10" presetClass="entr" presetSubtype="0" fill="hold" grpId="0" nodeType="withEffect">
+                                  <p:stCondLst>
+                                    <p:cond delay="0"/>
+                                  </p:stCondLst>
+                                  <p:childTnLst>
+                                    <p:set>
+                                      <p:cBhvr>
+                                        <p:cTn id="21" dur="1" fill="hold">
+                                          <p:stCondLst>
+                                            <p:cond delay="0"/>
+                                          </p:stCondLst>
+                                        </p:cTn>
+                                        <p:tgtEl>
+                                          <p:spTgt spid="12"/>
+                                        </p:tgtEl>
+                                        <p:attrNameLst>
+                                          <p:attrName>style.visibility</p:attrName>
+                                        </p:attrNameLst>
+                                      </p:cBhvr>
+                                      <p:to>
+                                        <p:strVal val="visible"/>
+                                      </p:to>
+                                    </p:set>
+                                    <p:animEffect transition="in" filter="fade">
+                                      <p:cBhvr>
+                                        <p:cTn id="22" dur="500"/>
+                                        <p:tgtEl>
+                                          <p:spTgt spid="12"/>
+                                        </p:tgtEl>
+                                      </p:cBhvr>
+                                    </p:animEffect>
+                                  </p:childTnLst>
+                                </p:cTn>
+                              </p:par>
+                            </p:childTnLst>
+                          </p:cTn>
+                        </p:par>
+                      </p:childTnLst>
+                    </p:cTn>
+                  </p:par>
+                  <p:par>
+                    <p:cTn id="23" fill="hold">
+                      <p:stCondLst>
+                        <p:cond delay="indefinite"/>
+                      </p:stCondLst>
+                      <p:childTnLst>
+                        <p:par>
+                          <p:cTn id="24" fill="hold">
+                            <p:stCondLst>
+                              <p:cond delay="0"/>
+                            </p:stCondLst>
+                            <p:childTnLst>
+                              <p:par>
+                                <p:cTn id="25" presetID="10" presetClass="entr" presetSubtype="0" fill="hold" grpId="0" nodeType="clickEffect">
+                                  <p:stCondLst>
+                                    <p:cond delay="0"/>
+                                  </p:stCondLst>
+                                  <p:childTnLst>
+                                    <p:set>
+                                      <p:cBhvr>
+                                        <p:cTn id="26" dur="1" fill="hold">
+                                          <p:stCondLst>
+                                            <p:cond delay="0"/>
+                                          </p:stCondLst>
+                                        </p:cTn>
+                                        <p:tgtEl>
+                                          <p:spTgt spid="11"/>
+                                        </p:tgtEl>
+                                        <p:attrNameLst>
+                                          <p:attrName>style.visibility</p:attrName>
+                                        </p:attrNameLst>
+                                      </p:cBhvr>
+                                      <p:to>
+                                        <p:strVal val="visible"/>
+                                      </p:to>
+                                    </p:set>
+                                    <p:animEffect transition="in" filter="fade">
+                                      <p:cBhvr>
+                                        <p:cTn id="27" dur="500"/>
+                                        <p:tgtEl>
+                                          <p:spTgt spid="11"/>
+                                        </p:tgtEl>
+                                      </p:cBhvr>
+                                    </p:animEffect>
+                                  </p:childTnLst>
+                                </p:cTn>
+                              </p:par>
+                              <p:par>
+                                <p:cTn id="28" presetID="10" presetClass="entr" presetSubtype="0" fill="hold" grpId="0" nodeType="withEffect">
+                                  <p:stCondLst>
+                                    <p:cond delay="0"/>
+                                  </p:stCondLst>
+                                  <p:childTnLst>
+                                    <p:set>
+                                      <p:cBhvr>
+                                        <p:cTn id="29" dur="1" fill="hold">
+                                          <p:stCondLst>
+                                            <p:cond delay="0"/>
+                                          </p:stCondLst>
+                                        </p:cTn>
+                                        <p:tgtEl>
+                                          <p:spTgt spid="10"/>
+                                        </p:tgtEl>
+                                        <p:attrNameLst>
+                                          <p:attrName>style.visibility</p:attrName>
+                                        </p:attrNameLst>
+                                      </p:cBhvr>
+                                      <p:to>
+                                        <p:strVal val="visible"/>
+                                      </p:to>
+                                    </p:set>
+                                    <p:animEffect transition="in" filter="fade">
+                                      <p:cBhvr>
+                                        <p:cTn id="30" dur="500"/>
+                                        <p:tgtEl>
+                                          <p:spTgt spid="10"/>
+                                        </p:tgtEl>
+                                      </p:cBhvr>
+                                    </p:animEffect>
+                                  </p:childTnLst>
+                                </p:cTn>
+                              </p:par>
+                            </p:childTnLst>
+                          </p:cTn>
+                        </p:par>
+                      </p:childTnLst>
+                    </p:cTn>
+                  </p:par>
+                  <p:par>
+                    <p:cTn id="31" fill="hold">
+                      <p:stCondLst>
+                        <p:cond delay="indefinite"/>
+                      </p:stCondLst>
+                      <p:childTnLst>
+                        <p:par>
+                          <p:cTn id="32" fill="hold">
+                            <p:stCondLst>
+                              <p:cond delay="0"/>
+                            </p:stCondLst>
+                            <p:childTnLst>
+                              <p:par>
+                                <p:cTn id="33" presetID="1" presetClass="entr" presetSubtype="0" fill="hold" grpId="0" nodeType="clickEffect">
+                                  <p:stCondLst>
+                                    <p:cond delay="0"/>
+                                  </p:stCondLst>
+                                  <p:childTnLst>
+                                    <p:set>
+                                      <p:cBhvr>
+                                        <p:cTn id="34" dur="1" fill="hold">
+                                          <p:stCondLst>
+                                            <p:cond delay="0"/>
+                                          </p:stCondLst>
+                                        </p:cTn>
+                                        <p:tgtEl>
+                                          <p:spTgt spid="3">
+                                            <p:txEl>
+                                              <p:pRg st="1" end="1"/>
+                                            </p:txEl>
+                                          </p:spTgt>
+                                        </p:tgtEl>
+                                        <p:attrNameLst>
+                                          <p:attrName>style.visibility</p:attrName>
+                                        </p:attrNameLst>
+                                      </p:cBhvr>
+                                      <p:to>
+                                        <p:strVal val="visible"/>
+                                      </p:to>
+                                    </p:set>
+                                  </p:childTnLst>
+                                </p:cTn>
+                              </p:par>
+                            </p:childTnLst>
+                          </p:cTn>
+                        </p:par>
+                      </p:childTnLst>
+                    </p:cTn>
+                  </p:par>
+                </p:childTnLst>
+              </p:cTn>
+              <p:prevCondLst>
+                <p:cond evt="onPrev" delay="0">
+                  <p:tgtEl>
+                    <p:sldTgt/>
+                  </p:tgtEl>
+                </p:cond>
+              </p:prevCondLst>
+              <p:nextCondLst>
+                <p:cond evt="onNext" delay="0">
+                  <p:tgtEl>
+                    <p:sldTgt/>
+                  </p:tgtEl>
+                </p:cond>
+              </p:nextCondLst>
+            </p:seq>
+          </p:childTnLst>
+        </p:cTn>
+      </p:par>
+    </p:tnLst>
+    <p:bldLst>
+      <p:bldP spid="3" grpId="0" uiExpand="1" build="p"/>
+      <p:bldP spid="8" grpId="0"/>
+      <p:bldP spid="9" grpId="0" animBg="1"/>
+      <p:bldP spid="10" grpId="0"/>
+      <p:bldP spid="11" grpId="0" animBg="1"/>
+      <p:bldP spid="12" grpId="0"/>
+      <p:bldP spid="13" grpId="0" animBg="1"/>
+    </p:bldLst>
+  </p:timing>
+</p:sld>
+</file>
+
+<file path=ppt/slides/slide6.xml><?xml version="1.0" encoding="utf-8"?>
+<p:sld xmlns:a="http://schemas.openxmlformats.org/drawingml/2006/main" xmlns:r="http://schemas.openxmlformats.org/officeDocument/2006/relationships" xmlns:p="http://schemas.openxmlformats.org/presentationml/2006/main">
+  <p:cSld>
+    <p:spTree>
+      <p:nvGrpSpPr>
+        <p:cNvPr id="1" name=""/>
+        <p:cNvGrpSpPr/>
+        <p:nvPr/>
+      </p:nvGrpSpPr>
+      <p:grpSpPr>
+        <a:xfrm>
+          <a:off x="0" y="0"/>
+          <a:ext cx="0" cy="0"/>
+          <a:chOff x="0" y="0"/>
+          <a:chExt cx="0" cy="0"/>
+        </a:xfrm>
+      </p:grpSpPr>
+      <p:sp>
+        <p:nvSpPr>
+          <p:cNvPr id="2" name="Title 1"/>
+          <p:cNvSpPr>
+            <a:spLocks noGrp="1"/>
+          </p:cNvSpPr>
+          <p:nvPr>
+            <p:ph type="title"/>
+          </p:nvPr>
+        </p:nvSpPr>
+        <p:spPr/>
+        <p:txBody>
+          <a:bodyPr/>
+          <a:lstStyle/>
+          <a:p>
+            <a:r>
+              <a:rPr lang="en-US"/>
+              <a:t>Moments in 3D</a:t>
+            </a:r>
+          </a:p>
+        </p:txBody>
+      </p:sp>
+      <p:sp>
+        <p:nvSpPr>
+          <p:cNvPr id="3" name="Content Placeholder 2"/>
+          <p:cNvSpPr>
+            <a:spLocks noGrp="1"/>
+          </p:cNvSpPr>
+          <p:nvPr>
+            <p:ph idx="1"/>
+          </p:nvPr>
+        </p:nvSpPr>
+        <p:spPr>
+          <a:xfrm>
+            <a:off x="457200" y="1600200"/>
+            <a:ext cx="8229600" cy="2286000"/>
+          </a:xfrm>
+        </p:spPr>
+        <p:txBody>
+          <a:bodyPr>
+            <a:normAutofit fontScale="92500"/>
+          </a:bodyPr>
+          <a:lstStyle/>
+          <a:p>
+            <a:r>
+              <a:rPr lang="en-US" dirty="0"/>
+              <a:t>In three dimensions, the magnitude will stay the same, but now the direction is more complex. </a:t>
+            </a:r>
+          </a:p>
+          <a:p>
+            <a:r>
+              <a:rPr lang="en-US" dirty="0"/>
+              <a:t>A moment can now be applied about </a:t>
+            </a:r>
+            <a:r>
+              <a:rPr lang="en-US" b="1" dirty="0"/>
+              <a:t>any axis</a:t>
+            </a:r>
+            <a:r>
+              <a:rPr lang="en-US" dirty="0"/>
+              <a:t>, so we need to add or subtract them as vectors.</a:t>
+            </a:r>
+          </a:p>
+        </p:txBody>
+      </p:sp>
+      <p:sp>
+        <p:nvSpPr>
+          <p:cNvPr id="4" name="Slide Number Placeholder 3"/>
+          <p:cNvSpPr>
+            <a:spLocks noGrp="1"/>
+          </p:cNvSpPr>
+          <p:nvPr>
+            <p:ph type="sldNum" sz="quarter" idx="12"/>
+          </p:nvPr>
+        </p:nvSpPr>
+        <p:spPr/>
+        <p:txBody>
+          <a:bodyPr/>
+          <a:lstStyle/>
+          <a:p>
+            <a:fld id="{929262FE-7F58-4A1E-8AF3-5A510A86DEBD}" type="slidenum">
+              <a:rPr lang="en-US" smtClean="0"/>
+              <a:t>6</a:t>
+            </a:fld>
+            <a:endParaRPr lang="en-US"/>
+          </a:p>
+        </p:txBody>
+      </p:sp>
+      <p:pic>
+        <p:nvPicPr>
+          <p:cNvPr id="6" name="Picture 2">
+            <a:extLst>
+              <a:ext uri="{FF2B5EF4-FFF2-40B4-BE49-F238E27FC236}">
+                <a16:creationId xmlns:a16="http://schemas.microsoft.com/office/drawing/2014/main" id="{414E10B5-0A4E-42A2-8B43-5E93C5477A1F}"/>
+              </a:ext>
+            </a:extLst>
+          </p:cNvPr>
+          <p:cNvPicPr>
+            <a:picLocks noChangeAspect="1" noChangeArrowheads="1"/>
+          </p:cNvPicPr>
+          <p:nvPr/>
+        </p:nvPicPr>
+        <p:blipFill>
+          <a:blip r:embed="rId2">
+            <a:extLst>
+              <a:ext uri="{28A0092B-C50C-407E-A947-70E740481C1C}">
+                <a14:useLocalDpi xmlns:a14="http://schemas.microsoft.com/office/drawing/2010/main" val="0"/>
+              </a:ext>
+            </a:extLst>
+          </a:blip>
+          <a:srcRect/>
+          <a:stretch>
+            <a:fillRect/>
+          </a:stretch>
+        </p:blipFill>
+        <p:spPr bwMode="auto">
+          <a:xfrm>
+            <a:off x="2209800" y="4053840"/>
+            <a:ext cx="4191000" cy="2766060"/>
+          </a:xfrm>
+          <a:prstGeom prst="rect">
+            <a:avLst/>
+          </a:prstGeom>
+          <a:noFill/>
+          <a:extLst>
+            <a:ext uri="{909E8E84-426E-40DD-AFC4-6F175D3DCCD1}">
+              <a14:hiddenFill xmlns:a14="http://schemas.microsoft.com/office/drawing/2010/main">
+                <a:solidFill>
+                  <a:srgbClr val="FFFFFF"/>
+                </a:solidFill>
+              </a14:hiddenFill>
+            </a:ext>
+          </a:extLst>
+        </p:spPr>
+      </p:pic>
+    </p:spTree>
+    <p:extLst>
+      <p:ext uri="{BB962C8B-B14F-4D97-AF65-F5344CB8AC3E}">
+        <p14:creationId xmlns:p14="http://schemas.microsoft.com/office/powerpoint/2010/main" val="3535607454"/>
       </p:ext>
     </p:extLst>
   </p:cSld>
@@ -5965,7 +6392,7 @@
                                           </p:stCondLst>
                                         </p:cTn>
                                         <p:tgtEl>
-                                          <p:spTgt spid="1026"/>
+                                          <p:spTgt spid="6"/>
                                         </p:tgtEl>
                                         <p:attrNameLst>
                                           <p:attrName>style.visibility</p:attrName>
@@ -5979,7 +6406,7 @@
                                       <p:cBhvr>
                                         <p:cTn id="15" dur="500"/>
                                         <p:tgtEl>
-                                          <p:spTgt spid="1026"/>
+                                          <p:spTgt spid="6"/>
                                         </p:tgtEl>
                                       </p:cBhvr>
                                     </p:animEffect>
@@ -6014,7 +6441,7 @@
       </p:par>
     </p:tnLst>
     <p:bldLst>
-      <p:bldP spid="3" grpId="0" build="p"/>
+      <p:bldP spid="3" grpId="0" uiExpand="1" build="p"/>
     </p:bldLst>
   </p:timing>
 </p:sld>
@@ -6665,12 +7092,6 @@
 </file>
 
 <file path=customXml/item1.xml><?xml version="1.0" encoding="utf-8"?>
-<p:properties xmlns:p="http://schemas.microsoft.com/office/2006/metadata/properties" xmlns:xsi="http://www.w3.org/2001/XMLSchema-instance" xmlns:pc="http://schemas.microsoft.com/office/infopath/2007/PartnerControls">
-  <documentManagement/>
-</p:properties>
-</file>
-
-<file path=customXml/item2.xml><?xml version="1.0" encoding="utf-8"?>
 <ct:contentTypeSchema xmlns:ct="http://schemas.microsoft.com/office/2006/metadata/contentType" xmlns:ma="http://schemas.microsoft.com/office/2006/metadata/properties/metaAttributes" ct:_="" ma:_="" ma:contentTypeName="Document" ma:contentTypeID="0x010100A06DF21F5BB2734A800ED30F3F452129" ma:contentTypeVersion="12" ma:contentTypeDescription="Create a new document." ma:contentTypeScope="" ma:versionID="544d96a5fbac5de9d5d902b535c73fb2">
   <xsd:schema xmlns:xsd="http://www.w3.org/2001/XMLSchema" xmlns:xs="http://www.w3.org/2001/XMLSchema" xmlns:p="http://schemas.microsoft.com/office/2006/metadata/properties" xmlns:ns3="90d05cb5-950f-4f68-bc2c-e17794455b92" xmlns:ns4="b4eab9fa-dbb0-4082-8491-8bd54207a265" targetNamespace="http://schemas.microsoft.com/office/2006/metadata/properties" ma:root="true" ma:fieldsID="7a710efc71c2169bf9c05e5a40dddf12" ns3:_="" ns4:_="">
     <xsd:import namespace="90d05cb5-950f-4f68-bc2c-e17794455b92"/>
@@ -6887,7 +7308,7 @@
 </ct:contentTypeSchema>
 </file>
 
-<file path=customXml/item3.xml><?xml version="1.0" encoding="utf-8"?>
+<file path=customXml/item2.xml><?xml version="1.0" encoding="utf-8"?>
 <?mso-contentType ?>
 <FormTemplates xmlns="http://schemas.microsoft.com/sharepoint/v3/contenttype/forms">
   <Display>DocumentLibraryForm</Display>
@@ -6896,16 +7317,13 @@
 </FormTemplates>
 </file>
 
-<file path=customXml/itemProps1.xml><?xml version="1.0" encoding="utf-8"?>
-<ds:datastoreItem xmlns:ds="http://schemas.openxmlformats.org/officeDocument/2006/customXml" ds:itemID="{52EB1464-66D1-425A-BBB5-7A9312BBE9C4}">
-  <ds:schemaRefs>
-    <ds:schemaRef ds:uri="http://schemas.microsoft.com/office/2006/metadata/properties"/>
-    <ds:schemaRef ds:uri="http://schemas.microsoft.com/office/infopath/2007/PartnerControls"/>
-  </ds:schemaRefs>
-</ds:datastoreItem>
+<file path=customXml/item3.xml><?xml version="1.0" encoding="utf-8"?>
+<p:properties xmlns:p="http://schemas.microsoft.com/office/2006/metadata/properties" xmlns:xsi="http://www.w3.org/2001/XMLSchema-instance" xmlns:pc="http://schemas.microsoft.com/office/infopath/2007/PartnerControls">
+  <documentManagement/>
+</p:properties>
 </file>
 
-<file path=customXml/itemProps2.xml><?xml version="1.0" encoding="utf-8"?>
+<file path=customXml/itemProps1.xml><?xml version="1.0" encoding="utf-8"?>
 <ds:datastoreItem xmlns:ds="http://schemas.openxmlformats.org/officeDocument/2006/customXml" ds:itemID="{A43B8A4B-79FE-4529-931C-D64224FA70E3}">
   <ds:schemaRefs>
     <ds:schemaRef ds:uri="http://schemas.microsoft.com/office/2006/metadata/contentType"/>
@@ -6924,10 +7342,19 @@
 </ds:datastoreItem>
 </file>
 
-<file path=customXml/itemProps3.xml><?xml version="1.0" encoding="utf-8"?>
+<file path=customXml/itemProps2.xml><?xml version="1.0" encoding="utf-8"?>
 <ds:datastoreItem xmlns:ds="http://schemas.openxmlformats.org/officeDocument/2006/customXml" ds:itemID="{F5CF5F32-56DC-4068-8B04-457CF34A96F3}">
   <ds:schemaRefs>
     <ds:schemaRef ds:uri="http://schemas.microsoft.com/sharepoint/v3/contenttype/forms"/>
   </ds:schemaRefs>
 </ds:datastoreItem>
+</file>
+
+<file path=customXml/itemProps3.xml><?xml version="1.0" encoding="utf-8"?>
+<ds:datastoreItem xmlns:ds="http://schemas.openxmlformats.org/officeDocument/2006/customXml" ds:itemID="{52EB1464-66D1-425A-BBB5-7A9312BBE9C4}">
+  <ds:schemaRefs>
+    <ds:schemaRef ds:uri="http://schemas.microsoft.com/office/2006/metadata/properties"/>
+    <ds:schemaRef ds:uri="http://schemas.microsoft.com/office/infopath/2007/PartnerControls"/>
+  </ds:schemaRefs>
+</ds:datastoreItem>
 </file>
</xml_diff>